<commit_message>
Consolidated edit categories into Administer Group. Update to use spinner instead of listview.
</commit_message>
<xml_diff>
--- a/ProjectLayouts.pptx
+++ b/ProjectLayouts.pptx
@@ -10,11 +10,12 @@
     <p:sldId id="259" r:id="rId4"/>
     <p:sldId id="260" r:id="rId5"/>
     <p:sldId id="261" r:id="rId6"/>
-    <p:sldId id="262" r:id="rId7"/>
-    <p:sldId id="263" r:id="rId8"/>
-    <p:sldId id="264" r:id="rId9"/>
-    <p:sldId id="265" r:id="rId10"/>
-    <p:sldId id="266" r:id="rId11"/>
+    <p:sldId id="263" r:id="rId7"/>
+    <p:sldId id="264" r:id="rId8"/>
+    <p:sldId id="265" r:id="rId9"/>
+    <p:sldId id="266" r:id="rId10"/>
+    <p:sldId id="267" r:id="rId11"/>
+    <p:sldId id="262" r:id="rId12"/>
   </p:sldIdLst>
   <p:sldSz cx="9144000" cy="6858000" type="screen4x3"/>
   <p:notesSz cx="6858000" cy="9144000"/>
@@ -113,6 +114,22 @@
       </a:defRPr>
     </a:lvl9pPr>
   </p:defaultTextStyle>
+  <p:extLst>
+    <p:ext uri="{EFAFB233-063F-42B5-8137-9DF3F51BA10A}">
+      <p15:sldGuideLst xmlns:p15="http://schemas.microsoft.com/office/powerpoint/2012/main">
+        <p15:guide id="1" orient="horz" pos="2160">
+          <p15:clr>
+            <a:srgbClr val="A4A3A4"/>
+          </p15:clr>
+        </p15:guide>
+        <p15:guide id="2" pos="2880">
+          <p15:clr>
+            <a:srgbClr val="A4A3A4"/>
+          </p15:clr>
+        </p15:guide>
+      </p15:sldGuideLst>
+    </p:ext>
+  </p:extLst>
 </p:presentation>
 </file>
 
@@ -154,10 +171,9 @@
           <a:lstStyle/>
           <a:p>
             <a:r>
-              <a:rPr lang="en-US" smtClean="0"/>
+              <a:rPr lang="en-US"/>
               <a:t>Click to edit Master title style</a:t>
             </a:r>
-            <a:endParaRPr lang="en-US"/>
           </a:p>
         </p:txBody>
       </p:sp>
@@ -273,10 +289,9 @@
           </a:lstStyle>
           <a:p>
             <a:r>
-              <a:rPr lang="en-US" smtClean="0"/>
+              <a:rPr lang="en-US"/>
               <a:t>Click to edit Master subtitle style</a:t>
             </a:r>
-            <a:endParaRPr lang="en-US"/>
           </a:p>
         </p:txBody>
       </p:sp>
@@ -297,7 +312,7 @@
           <a:p>
             <a:fld id="{566A6A97-3DE1-4BF9-B118-F24947EF4732}" type="datetimeFigureOut">
               <a:rPr lang="en-US" smtClean="0"/>
-              <a:t>11/18/2019</a:t>
+              <a:t>11/23/2019</a:t>
             </a:fld>
             <a:endParaRPr lang="en-US"/>
           </a:p>
@@ -391,10 +406,9 @@
           <a:lstStyle/>
           <a:p>
             <a:r>
-              <a:rPr lang="en-US" smtClean="0"/>
+              <a:rPr lang="en-US"/>
               <a:t>Click to edit Master title style</a:t>
             </a:r>
-            <a:endParaRPr lang="en-US"/>
           </a:p>
         </p:txBody>
       </p:sp>
@@ -415,38 +429,37 @@
           <a:p>
             <a:pPr lvl="0"/>
             <a:r>
-              <a:rPr lang="en-US" smtClean="0"/>
+              <a:rPr lang="en-US"/>
               <a:t>Click to edit Master text styles</a:t>
             </a:r>
           </a:p>
           <a:p>
             <a:pPr lvl="1"/>
             <a:r>
-              <a:rPr lang="en-US" smtClean="0"/>
+              <a:rPr lang="en-US"/>
               <a:t>Second level</a:t>
             </a:r>
           </a:p>
           <a:p>
             <a:pPr lvl="2"/>
             <a:r>
-              <a:rPr lang="en-US" smtClean="0"/>
+              <a:rPr lang="en-US"/>
               <a:t>Third level</a:t>
             </a:r>
           </a:p>
           <a:p>
             <a:pPr lvl="3"/>
             <a:r>
-              <a:rPr lang="en-US" smtClean="0"/>
+              <a:rPr lang="en-US"/>
               <a:t>Fourth level</a:t>
             </a:r>
           </a:p>
           <a:p>
             <a:pPr lvl="4"/>
             <a:r>
-              <a:rPr lang="en-US" smtClean="0"/>
+              <a:rPr lang="en-US"/>
               <a:t>Fifth level</a:t>
             </a:r>
-            <a:endParaRPr lang="en-US"/>
           </a:p>
         </p:txBody>
       </p:sp>
@@ -467,7 +480,7 @@
           <a:p>
             <a:fld id="{566A6A97-3DE1-4BF9-B118-F24947EF4732}" type="datetimeFigureOut">
               <a:rPr lang="en-US" smtClean="0"/>
-              <a:t>11/18/2019</a:t>
+              <a:t>11/23/2019</a:t>
             </a:fld>
             <a:endParaRPr lang="en-US"/>
           </a:p>
@@ -566,10 +579,9 @@
           <a:lstStyle/>
           <a:p>
             <a:r>
-              <a:rPr lang="en-US" smtClean="0"/>
+              <a:rPr lang="en-US"/>
               <a:t>Click to edit Master title style</a:t>
             </a:r>
-            <a:endParaRPr lang="en-US"/>
           </a:p>
         </p:txBody>
       </p:sp>
@@ -595,38 +607,37 @@
           <a:p>
             <a:pPr lvl="0"/>
             <a:r>
-              <a:rPr lang="en-US" smtClean="0"/>
+              <a:rPr lang="en-US"/>
               <a:t>Click to edit Master text styles</a:t>
             </a:r>
           </a:p>
           <a:p>
             <a:pPr lvl="1"/>
             <a:r>
-              <a:rPr lang="en-US" smtClean="0"/>
+              <a:rPr lang="en-US"/>
               <a:t>Second level</a:t>
             </a:r>
           </a:p>
           <a:p>
             <a:pPr lvl="2"/>
             <a:r>
-              <a:rPr lang="en-US" smtClean="0"/>
+              <a:rPr lang="en-US"/>
               <a:t>Third level</a:t>
             </a:r>
           </a:p>
           <a:p>
             <a:pPr lvl="3"/>
             <a:r>
-              <a:rPr lang="en-US" smtClean="0"/>
+              <a:rPr lang="en-US"/>
               <a:t>Fourth level</a:t>
             </a:r>
           </a:p>
           <a:p>
             <a:pPr lvl="4"/>
             <a:r>
-              <a:rPr lang="en-US" smtClean="0"/>
+              <a:rPr lang="en-US"/>
               <a:t>Fifth level</a:t>
             </a:r>
-            <a:endParaRPr lang="en-US"/>
           </a:p>
         </p:txBody>
       </p:sp>
@@ -647,7 +658,7 @@
           <a:p>
             <a:fld id="{566A6A97-3DE1-4BF9-B118-F24947EF4732}" type="datetimeFigureOut">
               <a:rPr lang="en-US" smtClean="0"/>
-              <a:t>11/18/2019</a:t>
+              <a:t>11/23/2019</a:t>
             </a:fld>
             <a:endParaRPr lang="en-US"/>
           </a:p>
@@ -741,10 +752,9 @@
           <a:lstStyle/>
           <a:p>
             <a:r>
-              <a:rPr lang="en-US" smtClean="0"/>
+              <a:rPr lang="en-US"/>
               <a:t>Click to edit Master title style</a:t>
             </a:r>
-            <a:endParaRPr lang="en-US"/>
           </a:p>
         </p:txBody>
       </p:sp>
@@ -765,38 +775,37 @@
           <a:p>
             <a:pPr lvl="0"/>
             <a:r>
-              <a:rPr lang="en-US" smtClean="0"/>
+              <a:rPr lang="en-US"/>
               <a:t>Click to edit Master text styles</a:t>
             </a:r>
           </a:p>
           <a:p>
             <a:pPr lvl="1"/>
             <a:r>
-              <a:rPr lang="en-US" smtClean="0"/>
+              <a:rPr lang="en-US"/>
               <a:t>Second level</a:t>
             </a:r>
           </a:p>
           <a:p>
             <a:pPr lvl="2"/>
             <a:r>
-              <a:rPr lang="en-US" smtClean="0"/>
+              <a:rPr lang="en-US"/>
               <a:t>Third level</a:t>
             </a:r>
           </a:p>
           <a:p>
             <a:pPr lvl="3"/>
             <a:r>
-              <a:rPr lang="en-US" smtClean="0"/>
+              <a:rPr lang="en-US"/>
               <a:t>Fourth level</a:t>
             </a:r>
           </a:p>
           <a:p>
             <a:pPr lvl="4"/>
             <a:r>
-              <a:rPr lang="en-US" smtClean="0"/>
+              <a:rPr lang="en-US"/>
               <a:t>Fifth level</a:t>
             </a:r>
-            <a:endParaRPr lang="en-US"/>
           </a:p>
         </p:txBody>
       </p:sp>
@@ -817,7 +826,7 @@
           <a:p>
             <a:fld id="{566A6A97-3DE1-4BF9-B118-F24947EF4732}" type="datetimeFigureOut">
               <a:rPr lang="en-US" smtClean="0"/>
-              <a:t>11/18/2019</a:t>
+              <a:t>11/23/2019</a:t>
             </a:fld>
             <a:endParaRPr lang="en-US"/>
           </a:p>
@@ -920,10 +929,9 @@
           </a:lstStyle>
           <a:p>
             <a:r>
-              <a:rPr lang="en-US" smtClean="0"/>
+              <a:rPr lang="en-US"/>
               <a:t>Click to edit Master title style</a:t>
             </a:r>
-            <a:endParaRPr lang="en-US"/>
           </a:p>
         </p:txBody>
       </p:sp>
@@ -1040,7 +1048,7 @@
           <a:p>
             <a:pPr lvl="0"/>
             <a:r>
-              <a:rPr lang="en-US" smtClean="0"/>
+              <a:rPr lang="en-US"/>
               <a:t>Click to edit Master text styles</a:t>
             </a:r>
           </a:p>
@@ -1063,7 +1071,7 @@
           <a:p>
             <a:fld id="{566A6A97-3DE1-4BF9-B118-F24947EF4732}" type="datetimeFigureOut">
               <a:rPr lang="en-US" smtClean="0"/>
-              <a:t>11/18/2019</a:t>
+              <a:t>11/23/2019</a:t>
             </a:fld>
             <a:endParaRPr lang="en-US"/>
           </a:p>
@@ -1157,10 +1165,9 @@
           <a:lstStyle/>
           <a:p>
             <a:r>
-              <a:rPr lang="en-US" smtClean="0"/>
+              <a:rPr lang="en-US"/>
               <a:t>Click to edit Master title style</a:t>
             </a:r>
-            <a:endParaRPr lang="en-US"/>
           </a:p>
         </p:txBody>
       </p:sp>
@@ -1214,38 +1221,37 @@
           <a:p>
             <a:pPr lvl="0"/>
             <a:r>
-              <a:rPr lang="en-US" smtClean="0"/>
+              <a:rPr lang="en-US"/>
               <a:t>Click to edit Master text styles</a:t>
             </a:r>
           </a:p>
           <a:p>
             <a:pPr lvl="1"/>
             <a:r>
-              <a:rPr lang="en-US" smtClean="0"/>
+              <a:rPr lang="en-US"/>
               <a:t>Second level</a:t>
             </a:r>
           </a:p>
           <a:p>
             <a:pPr lvl="2"/>
             <a:r>
-              <a:rPr lang="en-US" smtClean="0"/>
+              <a:rPr lang="en-US"/>
               <a:t>Third level</a:t>
             </a:r>
           </a:p>
           <a:p>
             <a:pPr lvl="3"/>
             <a:r>
-              <a:rPr lang="en-US" smtClean="0"/>
+              <a:rPr lang="en-US"/>
               <a:t>Fourth level</a:t>
             </a:r>
           </a:p>
           <a:p>
             <a:pPr lvl="4"/>
             <a:r>
-              <a:rPr lang="en-US" smtClean="0"/>
+              <a:rPr lang="en-US"/>
               <a:t>Fifth level</a:t>
             </a:r>
-            <a:endParaRPr lang="en-US"/>
           </a:p>
         </p:txBody>
       </p:sp>
@@ -1299,38 +1305,37 @@
           <a:p>
             <a:pPr lvl="0"/>
             <a:r>
-              <a:rPr lang="en-US" smtClean="0"/>
+              <a:rPr lang="en-US"/>
               <a:t>Click to edit Master text styles</a:t>
             </a:r>
           </a:p>
           <a:p>
             <a:pPr lvl="1"/>
             <a:r>
-              <a:rPr lang="en-US" smtClean="0"/>
+              <a:rPr lang="en-US"/>
               <a:t>Second level</a:t>
             </a:r>
           </a:p>
           <a:p>
             <a:pPr lvl="2"/>
             <a:r>
-              <a:rPr lang="en-US" smtClean="0"/>
+              <a:rPr lang="en-US"/>
               <a:t>Third level</a:t>
             </a:r>
           </a:p>
           <a:p>
             <a:pPr lvl="3"/>
             <a:r>
-              <a:rPr lang="en-US" smtClean="0"/>
+              <a:rPr lang="en-US"/>
               <a:t>Fourth level</a:t>
             </a:r>
           </a:p>
           <a:p>
             <a:pPr lvl="4"/>
             <a:r>
-              <a:rPr lang="en-US" smtClean="0"/>
+              <a:rPr lang="en-US"/>
               <a:t>Fifth level</a:t>
             </a:r>
-            <a:endParaRPr lang="en-US"/>
           </a:p>
         </p:txBody>
       </p:sp>
@@ -1351,7 +1356,7 @@
           <a:p>
             <a:fld id="{566A6A97-3DE1-4BF9-B118-F24947EF4732}" type="datetimeFigureOut">
               <a:rPr lang="en-US" smtClean="0"/>
-              <a:t>11/18/2019</a:t>
+              <a:t>11/23/2019</a:t>
             </a:fld>
             <a:endParaRPr lang="en-US"/>
           </a:p>
@@ -1449,10 +1454,9 @@
           </a:lstStyle>
           <a:p>
             <a:r>
-              <a:rPr lang="en-US" smtClean="0"/>
+              <a:rPr lang="en-US"/>
               <a:t>Click to edit Master title style</a:t>
             </a:r>
-            <a:endParaRPr lang="en-US"/>
           </a:p>
         </p:txBody>
       </p:sp>
@@ -1515,7 +1519,7 @@
           <a:p>
             <a:pPr lvl="0"/>
             <a:r>
-              <a:rPr lang="en-US" smtClean="0"/>
+              <a:rPr lang="en-US"/>
               <a:t>Click to edit Master text styles</a:t>
             </a:r>
           </a:p>
@@ -1571,38 +1575,37 @@
           <a:p>
             <a:pPr lvl="0"/>
             <a:r>
-              <a:rPr lang="en-US" smtClean="0"/>
+              <a:rPr lang="en-US"/>
               <a:t>Click to edit Master text styles</a:t>
             </a:r>
           </a:p>
           <a:p>
             <a:pPr lvl="1"/>
             <a:r>
-              <a:rPr lang="en-US" smtClean="0"/>
+              <a:rPr lang="en-US"/>
               <a:t>Second level</a:t>
             </a:r>
           </a:p>
           <a:p>
             <a:pPr lvl="2"/>
             <a:r>
-              <a:rPr lang="en-US" smtClean="0"/>
+              <a:rPr lang="en-US"/>
               <a:t>Third level</a:t>
             </a:r>
           </a:p>
           <a:p>
             <a:pPr lvl="3"/>
             <a:r>
-              <a:rPr lang="en-US" smtClean="0"/>
+              <a:rPr lang="en-US"/>
               <a:t>Fourth level</a:t>
             </a:r>
           </a:p>
           <a:p>
             <a:pPr lvl="4"/>
             <a:r>
-              <a:rPr lang="en-US" smtClean="0"/>
+              <a:rPr lang="en-US"/>
               <a:t>Fifth level</a:t>
             </a:r>
-            <a:endParaRPr lang="en-US"/>
           </a:p>
         </p:txBody>
       </p:sp>
@@ -1665,7 +1668,7 @@
           <a:p>
             <a:pPr lvl="0"/>
             <a:r>
-              <a:rPr lang="en-US" smtClean="0"/>
+              <a:rPr lang="en-US"/>
               <a:t>Click to edit Master text styles</a:t>
             </a:r>
           </a:p>
@@ -1721,38 +1724,37 @@
           <a:p>
             <a:pPr lvl="0"/>
             <a:r>
-              <a:rPr lang="en-US" smtClean="0"/>
+              <a:rPr lang="en-US"/>
               <a:t>Click to edit Master text styles</a:t>
             </a:r>
           </a:p>
           <a:p>
             <a:pPr lvl="1"/>
             <a:r>
-              <a:rPr lang="en-US" smtClean="0"/>
+              <a:rPr lang="en-US"/>
               <a:t>Second level</a:t>
             </a:r>
           </a:p>
           <a:p>
             <a:pPr lvl="2"/>
             <a:r>
-              <a:rPr lang="en-US" smtClean="0"/>
+              <a:rPr lang="en-US"/>
               <a:t>Third level</a:t>
             </a:r>
           </a:p>
           <a:p>
             <a:pPr lvl="3"/>
             <a:r>
-              <a:rPr lang="en-US" smtClean="0"/>
+              <a:rPr lang="en-US"/>
               <a:t>Fourth level</a:t>
             </a:r>
           </a:p>
           <a:p>
             <a:pPr lvl="4"/>
             <a:r>
-              <a:rPr lang="en-US" smtClean="0"/>
+              <a:rPr lang="en-US"/>
               <a:t>Fifth level</a:t>
             </a:r>
-            <a:endParaRPr lang="en-US"/>
           </a:p>
         </p:txBody>
       </p:sp>
@@ -1773,7 +1775,7 @@
           <a:p>
             <a:fld id="{566A6A97-3DE1-4BF9-B118-F24947EF4732}" type="datetimeFigureOut">
               <a:rPr lang="en-US" smtClean="0"/>
-              <a:t>11/18/2019</a:t>
+              <a:t>11/23/2019</a:t>
             </a:fld>
             <a:endParaRPr lang="en-US"/>
           </a:p>
@@ -1867,10 +1869,9 @@
           <a:lstStyle/>
           <a:p>
             <a:r>
-              <a:rPr lang="en-US" smtClean="0"/>
+              <a:rPr lang="en-US"/>
               <a:t>Click to edit Master title style</a:t>
             </a:r>
-            <a:endParaRPr lang="en-US"/>
           </a:p>
         </p:txBody>
       </p:sp>
@@ -1891,7 +1892,7 @@
           <a:p>
             <a:fld id="{566A6A97-3DE1-4BF9-B118-F24947EF4732}" type="datetimeFigureOut">
               <a:rPr lang="en-US" smtClean="0"/>
-              <a:t>11/18/2019</a:t>
+              <a:t>11/23/2019</a:t>
             </a:fld>
             <a:endParaRPr lang="en-US"/>
           </a:p>
@@ -1986,7 +1987,7 @@
           <a:p>
             <a:fld id="{566A6A97-3DE1-4BF9-B118-F24947EF4732}" type="datetimeFigureOut">
               <a:rPr lang="en-US" smtClean="0"/>
-              <a:t>11/18/2019</a:t>
+              <a:t>11/23/2019</a:t>
             </a:fld>
             <a:endParaRPr lang="en-US"/>
           </a:p>
@@ -2089,10 +2090,9 @@
           </a:lstStyle>
           <a:p>
             <a:r>
-              <a:rPr lang="en-US" smtClean="0"/>
+              <a:rPr lang="en-US"/>
               <a:t>Click to edit Master title style</a:t>
             </a:r>
-            <a:endParaRPr lang="en-US"/>
           </a:p>
         </p:txBody>
       </p:sp>
@@ -2146,38 +2146,37 @@
           <a:p>
             <a:pPr lvl="0"/>
             <a:r>
-              <a:rPr lang="en-US" smtClean="0"/>
+              <a:rPr lang="en-US"/>
               <a:t>Click to edit Master text styles</a:t>
             </a:r>
           </a:p>
           <a:p>
             <a:pPr lvl="1"/>
             <a:r>
-              <a:rPr lang="en-US" smtClean="0"/>
+              <a:rPr lang="en-US"/>
               <a:t>Second level</a:t>
             </a:r>
           </a:p>
           <a:p>
             <a:pPr lvl="2"/>
             <a:r>
-              <a:rPr lang="en-US" smtClean="0"/>
+              <a:rPr lang="en-US"/>
               <a:t>Third level</a:t>
             </a:r>
           </a:p>
           <a:p>
             <a:pPr lvl="3"/>
             <a:r>
-              <a:rPr lang="en-US" smtClean="0"/>
+              <a:rPr lang="en-US"/>
               <a:t>Fourth level</a:t>
             </a:r>
           </a:p>
           <a:p>
             <a:pPr lvl="4"/>
             <a:r>
-              <a:rPr lang="en-US" smtClean="0"/>
+              <a:rPr lang="en-US"/>
               <a:t>Fifth level</a:t>
             </a:r>
-            <a:endParaRPr lang="en-US"/>
           </a:p>
         </p:txBody>
       </p:sp>
@@ -2240,7 +2239,7 @@
           <a:p>
             <a:pPr lvl="0"/>
             <a:r>
-              <a:rPr lang="en-US" smtClean="0"/>
+              <a:rPr lang="en-US"/>
               <a:t>Click to edit Master text styles</a:t>
             </a:r>
           </a:p>
@@ -2263,7 +2262,7 @@
           <a:p>
             <a:fld id="{566A6A97-3DE1-4BF9-B118-F24947EF4732}" type="datetimeFigureOut">
               <a:rPr lang="en-US" smtClean="0"/>
-              <a:t>11/18/2019</a:t>
+              <a:t>11/23/2019</a:t>
             </a:fld>
             <a:endParaRPr lang="en-US"/>
           </a:p>
@@ -2366,10 +2365,9 @@
           </a:lstStyle>
           <a:p>
             <a:r>
-              <a:rPr lang="en-US" smtClean="0"/>
+              <a:rPr lang="en-US"/>
               <a:t>Click to edit Master title style</a:t>
             </a:r>
-            <a:endParaRPr lang="en-US"/>
           </a:p>
         </p:txBody>
       </p:sp>
@@ -2493,7 +2491,7 @@
           <a:p>
             <a:pPr lvl="0"/>
             <a:r>
-              <a:rPr lang="en-US" smtClean="0"/>
+              <a:rPr lang="en-US"/>
               <a:t>Click to edit Master text styles</a:t>
             </a:r>
           </a:p>
@@ -2516,7 +2514,7 @@
           <a:p>
             <a:fld id="{566A6A97-3DE1-4BF9-B118-F24947EF4732}" type="datetimeFigureOut">
               <a:rPr lang="en-US" smtClean="0"/>
-              <a:t>11/18/2019</a:t>
+              <a:t>11/23/2019</a:t>
             </a:fld>
             <a:endParaRPr lang="en-US"/>
           </a:p>
@@ -2625,10 +2623,9 @@
           <a:lstStyle/>
           <a:p>
             <a:r>
-              <a:rPr lang="en-US" smtClean="0"/>
+              <a:rPr lang="en-US"/>
               <a:t>Click to edit Master title style</a:t>
             </a:r>
-            <a:endParaRPr lang="en-US"/>
           </a:p>
         </p:txBody>
       </p:sp>
@@ -2659,38 +2656,37 @@
           <a:p>
             <a:pPr lvl="0"/>
             <a:r>
-              <a:rPr lang="en-US" smtClean="0"/>
+              <a:rPr lang="en-US"/>
               <a:t>Click to edit Master text styles</a:t>
             </a:r>
           </a:p>
           <a:p>
             <a:pPr lvl="1"/>
             <a:r>
-              <a:rPr lang="en-US" smtClean="0"/>
+              <a:rPr lang="en-US"/>
               <a:t>Second level</a:t>
             </a:r>
           </a:p>
           <a:p>
             <a:pPr lvl="2"/>
             <a:r>
-              <a:rPr lang="en-US" smtClean="0"/>
+              <a:rPr lang="en-US"/>
               <a:t>Third level</a:t>
             </a:r>
           </a:p>
           <a:p>
             <a:pPr lvl="3"/>
             <a:r>
-              <a:rPr lang="en-US" smtClean="0"/>
+              <a:rPr lang="en-US"/>
               <a:t>Fourth level</a:t>
             </a:r>
           </a:p>
           <a:p>
             <a:pPr lvl="4"/>
             <a:r>
-              <a:rPr lang="en-US" smtClean="0"/>
+              <a:rPr lang="en-US"/>
               <a:t>Fifth level</a:t>
             </a:r>
-            <a:endParaRPr lang="en-US"/>
           </a:p>
         </p:txBody>
       </p:sp>
@@ -2729,7 +2725,7 @@
           <a:p>
             <a:fld id="{566A6A97-3DE1-4BF9-B118-F24947EF4732}" type="datetimeFigureOut">
               <a:rPr lang="en-US" smtClean="0"/>
-              <a:t>11/18/2019</a:t>
+              <a:t>11/23/2019</a:t>
             </a:fld>
             <a:endParaRPr lang="en-US"/>
           </a:p>
@@ -3120,10 +3116,9 @@
           <a:lstStyle/>
           <a:p>
             <a:r>
-              <a:rPr lang="en-US" dirty="0" smtClean="0"/>
+              <a:rPr lang="en-US" dirty="0"/>
               <a:t>Login</a:t>
             </a:r>
-            <a:endParaRPr lang="en-US" dirty="0"/>
           </a:p>
         </p:txBody>
       </p:sp>
@@ -3143,51 +3138,51 @@
           <a:lstStyle/>
           <a:p>
             <a:r>
-              <a:rPr lang="en-US" dirty="0" err="1" smtClean="0"/>
+              <a:rPr lang="en-US" dirty="0" err="1"/>
               <a:t>EditText</a:t>
             </a:r>
             <a:r>
-              <a:rPr lang="en-US" dirty="0" smtClean="0"/>
+              <a:rPr lang="en-US" dirty="0"/>
               <a:t> - Username</a:t>
             </a:r>
           </a:p>
           <a:p>
             <a:r>
-              <a:rPr lang="en-US" dirty="0" err="1" smtClean="0"/>
+              <a:rPr lang="en-US" dirty="0" err="1"/>
               <a:t>EditText</a:t>
             </a:r>
             <a:r>
-              <a:rPr lang="en-US" dirty="0" smtClean="0"/>
+              <a:rPr lang="en-US" dirty="0"/>
               <a:t> – Password</a:t>
             </a:r>
           </a:p>
           <a:p>
             <a:r>
-              <a:rPr lang="en-US" dirty="0" smtClean="0"/>
+              <a:rPr lang="en-US" dirty="0"/>
               <a:t>Button – Login</a:t>
             </a:r>
           </a:p>
           <a:p>
             <a:pPr lvl="1"/>
             <a:r>
-              <a:rPr lang="en-US" dirty="0" smtClean="0"/>
+              <a:rPr lang="en-US" dirty="0"/>
               <a:t>Sends Username and Password to database and returns success or failure</a:t>
             </a:r>
           </a:p>
           <a:p>
             <a:r>
-              <a:rPr lang="en-US" dirty="0" err="1" smtClean="0"/>
+              <a:rPr lang="en-US" dirty="0" err="1"/>
               <a:t>TextView</a:t>
             </a:r>
             <a:r>
-              <a:rPr lang="en-US" dirty="0" smtClean="0"/>
+              <a:rPr lang="en-US" dirty="0"/>
               <a:t> styled as Hyperlink – Register</a:t>
             </a:r>
           </a:p>
           <a:p>
             <a:pPr lvl="1"/>
             <a:r>
-              <a:rPr lang="en-US" dirty="0" smtClean="0"/>
+              <a:rPr lang="en-US" dirty="0"/>
               <a:t>Go to profile activity</a:t>
             </a:r>
           </a:p>
@@ -3225,7 +3220,13 @@
       </p:grpSpPr>
       <p:sp>
         <p:nvSpPr>
-          <p:cNvPr id="2" name="Title 1"/>
+          <p:cNvPr id="2" name="Title 1">
+            <a:extLst>
+              <a:ext uri="{FF2B5EF4-FFF2-40B4-BE49-F238E27FC236}">
+                <a16:creationId xmlns:a16="http://schemas.microsoft.com/office/drawing/2014/main" id="{4452320C-D5FF-4041-B9CE-91C19F5D427E}"/>
+              </a:ext>
+            </a:extLst>
+          </p:cNvPr>
           <p:cNvSpPr>
             <a:spLocks noGrp="1"/>
           </p:cNvSpPr>
@@ -3239,16 +3240,21 @@
           <a:lstStyle/>
           <a:p>
             <a:r>
-              <a:rPr lang="en-US" dirty="0" smtClean="0"/>
-              <a:t>Submit Receipt</a:t>
-            </a:r>
-            <a:endParaRPr lang="en-US" dirty="0"/>
-          </a:p>
-        </p:txBody>
-      </p:sp>
-      <p:sp>
-        <p:nvSpPr>
-          <p:cNvPr id="3" name="Content Placeholder 2"/>
+              <a:rPr lang="en-US" dirty="0"/>
+              <a:t>Backup</a:t>
+            </a:r>
+          </a:p>
+        </p:txBody>
+      </p:sp>
+      <p:sp>
+        <p:nvSpPr>
+          <p:cNvPr id="3" name="Content Placeholder 2">
+            <a:extLst>
+              <a:ext uri="{FF2B5EF4-FFF2-40B4-BE49-F238E27FC236}">
+                <a16:creationId xmlns:a16="http://schemas.microsoft.com/office/drawing/2014/main" id="{234B904D-9E3D-4A4B-B1AD-BD9C8DB4C56A}"/>
+              </a:ext>
+            </a:extLst>
+          </p:cNvPr>
           <p:cNvSpPr>
             <a:spLocks noGrp="1"/>
           </p:cNvSpPr>
@@ -3261,57 +3267,105 @@
           <a:bodyPr/>
           <a:lstStyle/>
           <a:p>
-            <a:r>
-              <a:rPr lang="en-US" dirty="0" smtClean="0"/>
-              <a:t>Spinner for category</a:t>
-            </a:r>
-          </a:p>
-          <a:p>
-            <a:r>
-              <a:rPr lang="en-US" dirty="0" err="1" smtClean="0"/>
-              <a:t>EditText</a:t>
-            </a:r>
-            <a:r>
-              <a:rPr lang="en-US" dirty="0" smtClean="0"/>
-              <a:t> for amount</a:t>
-            </a:r>
-          </a:p>
-          <a:p>
-            <a:r>
-              <a:rPr lang="en-US" dirty="0" err="1" smtClean="0"/>
-              <a:t>ImageView</a:t>
-            </a:r>
-            <a:r>
-              <a:rPr lang="en-US" dirty="0" smtClean="0"/>
-              <a:t> for receipt</a:t>
-            </a:r>
-          </a:p>
-          <a:p>
-            <a:r>
-              <a:rPr lang="en-US" dirty="0" smtClean="0"/>
-              <a:t>Button</a:t>
-            </a:r>
-          </a:p>
-          <a:p>
-            <a:pPr lvl="1"/>
-            <a:r>
-              <a:rPr lang="en-US" dirty="0" smtClean="0"/>
-              <a:t>Browse for receipt or take a picture</a:t>
-            </a:r>
-          </a:p>
-          <a:p>
-            <a:r>
-              <a:rPr lang="en-US" dirty="0" smtClean="0"/>
-              <a:t>Button to submit</a:t>
-            </a:r>
-            <a:endParaRPr lang="en-US" dirty="0"/>
+            <a:endParaRPr lang="en-US"/>
           </a:p>
         </p:txBody>
       </p:sp>
     </p:spTree>
     <p:extLst>
       <p:ext uri="{BB962C8B-B14F-4D97-AF65-F5344CB8AC3E}">
-        <p14:creationId xmlns:p14="http://schemas.microsoft.com/office/powerpoint/2010/main" val="535213632"/>
+        <p14:creationId xmlns:p14="http://schemas.microsoft.com/office/powerpoint/2010/main" val="3436432575"/>
+      </p:ext>
+    </p:extLst>
+  </p:cSld>
+  <p:clrMapOvr>
+    <a:masterClrMapping/>
+  </p:clrMapOvr>
+</p:sld>
+</file>
+
+<file path=ppt/slides/slide11.xml><?xml version="1.0" encoding="utf-8"?>
+<p:sld xmlns:a="http://schemas.openxmlformats.org/drawingml/2006/main" xmlns:r="http://schemas.openxmlformats.org/officeDocument/2006/relationships" xmlns:p="http://schemas.openxmlformats.org/presentationml/2006/main">
+  <p:cSld>
+    <p:spTree>
+      <p:nvGrpSpPr>
+        <p:cNvPr id="1" name=""/>
+        <p:cNvGrpSpPr/>
+        <p:nvPr/>
+      </p:nvGrpSpPr>
+      <p:grpSpPr>
+        <a:xfrm>
+          <a:off x="0" y="0"/>
+          <a:ext cx="0" cy="0"/>
+          <a:chOff x="0" y="0"/>
+          <a:chExt cx="0" cy="0"/>
+        </a:xfrm>
+      </p:grpSpPr>
+      <p:sp>
+        <p:nvSpPr>
+          <p:cNvPr id="2" name="Title 1"/>
+          <p:cNvSpPr>
+            <a:spLocks noGrp="1"/>
+          </p:cNvSpPr>
+          <p:nvPr>
+            <p:ph type="title"/>
+          </p:nvPr>
+        </p:nvSpPr>
+        <p:spPr/>
+        <p:txBody>
+          <a:bodyPr/>
+          <a:lstStyle/>
+          <a:p>
+            <a:r>
+              <a:rPr lang="en-US" dirty="0"/>
+              <a:t>Edit Group Categories</a:t>
+            </a:r>
+          </a:p>
+        </p:txBody>
+      </p:sp>
+      <p:sp>
+        <p:nvSpPr>
+          <p:cNvPr id="3" name="Content Placeholder 2"/>
+          <p:cNvSpPr>
+            <a:spLocks noGrp="1"/>
+          </p:cNvSpPr>
+          <p:nvPr>
+            <p:ph idx="1"/>
+          </p:nvPr>
+        </p:nvSpPr>
+        <p:spPr/>
+        <p:txBody>
+          <a:bodyPr/>
+          <a:lstStyle/>
+          <a:p>
+            <a:r>
+              <a:rPr lang="en-US" dirty="0" err="1"/>
+              <a:t>EditText</a:t>
+            </a:r>
+            <a:r>
+              <a:rPr lang="en-US" dirty="0"/>
+              <a:t> – Category Name</a:t>
+            </a:r>
+          </a:p>
+          <a:p>
+            <a:r>
+              <a:rPr lang="en-US" dirty="0" err="1"/>
+              <a:t>EditText</a:t>
+            </a:r>
+            <a:r>
+              <a:rPr lang="en-US" dirty="0"/>
+              <a:t> – Monthly limit</a:t>
+            </a:r>
+          </a:p>
+          <a:p>
+            <a:endParaRPr lang="en-US" dirty="0"/>
+          </a:p>
+        </p:txBody>
+      </p:sp>
+    </p:spTree>
+    <p:extLst>
+      <p:ext uri="{BB962C8B-B14F-4D97-AF65-F5344CB8AC3E}">
+        <p14:creationId xmlns:p14="http://schemas.microsoft.com/office/powerpoint/2010/main" val="628164929"/>
       </p:ext>
     </p:extLst>
   </p:cSld>
@@ -3354,10 +3408,9 @@
           <a:lstStyle/>
           <a:p>
             <a:r>
-              <a:rPr lang="en-US" dirty="0" smtClean="0"/>
+              <a:rPr lang="en-US" dirty="0"/>
               <a:t>Profile</a:t>
             </a:r>
-            <a:endParaRPr lang="en-US" dirty="0"/>
           </a:p>
         </p:txBody>
       </p:sp>
@@ -3379,94 +3432,93 @@
           <a:lstStyle/>
           <a:p>
             <a:r>
-              <a:rPr lang="en-US" dirty="0" err="1" smtClean="0"/>
+              <a:rPr lang="en-US" dirty="0" err="1"/>
               <a:t>EditText</a:t>
             </a:r>
             <a:r>
-              <a:rPr lang="en-US" dirty="0" smtClean="0"/>
+              <a:rPr lang="en-US" dirty="0"/>
               <a:t> – Username</a:t>
             </a:r>
           </a:p>
           <a:p>
             <a:r>
-              <a:rPr lang="en-US" dirty="0" err="1" smtClean="0"/>
+              <a:rPr lang="en-US" dirty="0" err="1"/>
               <a:t>EditText</a:t>
             </a:r>
             <a:r>
-              <a:rPr lang="en-US" dirty="0" smtClean="0"/>
+              <a:rPr lang="en-US" dirty="0"/>
               <a:t> – Password</a:t>
             </a:r>
           </a:p>
           <a:p>
             <a:r>
-              <a:rPr lang="en-US" dirty="0" err="1" smtClean="0"/>
+              <a:rPr lang="en-US" dirty="0" err="1"/>
               <a:t>EditText</a:t>
             </a:r>
             <a:r>
-              <a:rPr lang="en-US" dirty="0" smtClean="0"/>
+              <a:rPr lang="en-US" dirty="0"/>
               <a:t> – City</a:t>
             </a:r>
           </a:p>
           <a:p>
             <a:r>
-              <a:rPr lang="en-US" dirty="0" err="1" smtClean="0"/>
+              <a:rPr lang="en-US" dirty="0" err="1"/>
               <a:t>EditText</a:t>
             </a:r>
             <a:r>
-              <a:rPr lang="en-US" dirty="0" smtClean="0"/>
+              <a:rPr lang="en-US" dirty="0"/>
               <a:t> – State</a:t>
             </a:r>
           </a:p>
           <a:p>
             <a:r>
-              <a:rPr lang="en-US" dirty="0" err="1" smtClean="0"/>
+              <a:rPr lang="en-US" dirty="0" err="1"/>
               <a:t>ImageView</a:t>
             </a:r>
             <a:r>
-              <a:rPr lang="en-US" dirty="0" smtClean="0"/>
+              <a:rPr lang="en-US" dirty="0"/>
               <a:t> – Profile Picture</a:t>
             </a:r>
           </a:p>
           <a:p>
             <a:r>
-              <a:rPr lang="en-US" dirty="0" smtClean="0"/>
+              <a:rPr lang="en-US" dirty="0"/>
               <a:t>Button – Upload Picture</a:t>
             </a:r>
           </a:p>
           <a:p>
             <a:pPr lvl="1"/>
             <a:r>
-              <a:rPr lang="en-US" dirty="0" smtClean="0"/>
+              <a:rPr lang="en-US" dirty="0"/>
               <a:t>Browse for photo</a:t>
             </a:r>
           </a:p>
           <a:p>
             <a:r>
-              <a:rPr lang="en-US" dirty="0" smtClean="0"/>
+              <a:rPr lang="en-US" dirty="0"/>
               <a:t>Button – Submit</a:t>
             </a:r>
           </a:p>
           <a:p>
             <a:pPr lvl="1"/>
             <a:r>
-              <a:rPr lang="en-US" dirty="0" smtClean="0"/>
+              <a:rPr lang="en-US" dirty="0"/>
               <a:t>Submits to database and returns success or failure</a:t>
             </a:r>
           </a:p>
           <a:p>
             <a:pPr lvl="1"/>
             <a:r>
-              <a:rPr lang="en-US" dirty="0" smtClean="0"/>
+              <a:rPr lang="en-US" dirty="0"/>
               <a:t>Show alert dialog on failure</a:t>
             </a:r>
           </a:p>
           <a:p>
             <a:pPr lvl="1"/>
             <a:r>
-              <a:rPr lang="en-US" dirty="0" smtClean="0"/>
+              <a:rPr lang="en-US" dirty="0"/>
               <a:t>Go to Login on success</a:t>
             </a:r>
-            <a:endParaRPr lang="en-US" dirty="0"/>
           </a:p>
         </p:txBody>
       </p:sp>
@@ -3516,10 +3568,9 @@
           <a:lstStyle/>
           <a:p>
             <a:r>
-              <a:rPr lang="en-US" dirty="0" smtClean="0"/>
+              <a:rPr lang="en-US" dirty="0"/>
               <a:t>Opening Activity after Login</a:t>
             </a:r>
-            <a:endParaRPr lang="en-US" dirty="0"/>
           </a:p>
         </p:txBody>
       </p:sp>
@@ -3541,70 +3592,70 @@
           <a:lstStyle/>
           <a:p>
             <a:r>
-              <a:rPr lang="en-US" dirty="0" err="1" smtClean="0"/>
+              <a:rPr lang="en-US" dirty="0" err="1"/>
               <a:t>AppBar</a:t>
             </a:r>
-            <a:endParaRPr lang="en-US" dirty="0" smtClean="0"/>
+            <a:endParaRPr lang="en-US" dirty="0"/>
           </a:p>
           <a:p>
             <a:pPr lvl="1"/>
             <a:r>
-              <a:rPr lang="en-US" dirty="0" smtClean="0"/>
+              <a:rPr lang="en-US" dirty="0"/>
               <a:t>Settings Icon (Gear)</a:t>
             </a:r>
           </a:p>
           <a:p>
             <a:pPr lvl="2"/>
             <a:r>
-              <a:rPr lang="en-US" dirty="0" smtClean="0"/>
+              <a:rPr lang="en-US" dirty="0"/>
               <a:t>Takes you to profile page</a:t>
             </a:r>
           </a:p>
           <a:p>
             <a:r>
-              <a:rPr lang="en-US" dirty="0" smtClean="0"/>
+              <a:rPr lang="en-US" dirty="0"/>
               <a:t>Navigation Drawer</a:t>
             </a:r>
           </a:p>
           <a:p>
             <a:pPr lvl="1"/>
             <a:r>
-              <a:rPr lang="en-US" dirty="0" smtClean="0"/>
+              <a:rPr lang="en-US" dirty="0"/>
               <a:t>Administer Group</a:t>
             </a:r>
           </a:p>
           <a:p>
             <a:pPr lvl="2"/>
             <a:r>
-              <a:rPr lang="en-US" dirty="0" smtClean="0"/>
+              <a:rPr lang="en-US" dirty="0"/>
               <a:t>Will only show if you’re the owner</a:t>
             </a:r>
           </a:p>
           <a:p>
             <a:pPr lvl="1"/>
             <a:r>
-              <a:rPr lang="en-US" dirty="0" smtClean="0"/>
+              <a:rPr lang="en-US" dirty="0"/>
               <a:t>Create Group</a:t>
             </a:r>
           </a:p>
           <a:p>
             <a:pPr lvl="1"/>
             <a:r>
-              <a:rPr lang="en-US" dirty="0" smtClean="0"/>
+              <a:rPr lang="en-US" dirty="0"/>
               <a:t>Join Group</a:t>
             </a:r>
           </a:p>
           <a:p>
             <a:pPr lvl="1"/>
             <a:r>
-              <a:rPr lang="en-US" dirty="0" smtClean="0"/>
+              <a:rPr lang="en-US" dirty="0"/>
               <a:t>Leave Group</a:t>
             </a:r>
           </a:p>
           <a:p>
             <a:pPr lvl="1"/>
             <a:r>
-              <a:rPr lang="en-US" dirty="0" smtClean="0"/>
+              <a:rPr lang="en-US" dirty="0"/>
               <a:t>Submit Receipt</a:t>
             </a:r>
           </a:p>
@@ -3660,12 +3711,8 @@
           <a:lstStyle/>
           <a:p>
             <a:r>
-              <a:rPr lang="en-US" dirty="0" smtClean="0"/>
-              <a:t>Create Grou</a:t>
-            </a:r>
-            <a:r>
-              <a:rPr lang="en-US" dirty="0"/>
-              <a:t>p</a:t>
+              <a:rPr lang="en-US" dirty="0"/>
+              <a:t>Create Group</a:t>
             </a:r>
           </a:p>
         </p:txBody>
@@ -3686,41 +3733,41 @@
           <a:lstStyle/>
           <a:p>
             <a:r>
-              <a:rPr lang="en-US" dirty="0" err="1" smtClean="0"/>
+              <a:rPr lang="en-US" dirty="0" err="1"/>
               <a:t>EditText</a:t>
             </a:r>
             <a:r>
-              <a:rPr lang="en-US" dirty="0" smtClean="0"/>
+              <a:rPr lang="en-US" dirty="0"/>
               <a:t> – group name</a:t>
             </a:r>
           </a:p>
           <a:p>
             <a:r>
-              <a:rPr lang="en-US" dirty="0" smtClean="0"/>
+              <a:rPr lang="en-US" dirty="0"/>
               <a:t>Button – create group</a:t>
             </a:r>
           </a:p>
           <a:p>
             <a:pPr lvl="1"/>
             <a:r>
-              <a:rPr lang="en-US" dirty="0" smtClean="0"/>
+              <a:rPr lang="en-US" dirty="0"/>
               <a:t>Sends currently logged in user and group name to database</a:t>
             </a:r>
           </a:p>
           <a:p>
             <a:pPr lvl="1"/>
             <a:r>
-              <a:rPr lang="en-US" dirty="0" smtClean="0"/>
+              <a:rPr lang="en-US" dirty="0"/>
               <a:t>Return a secret token</a:t>
             </a:r>
           </a:p>
           <a:p>
             <a:r>
-              <a:rPr lang="en-US" dirty="0" err="1" smtClean="0"/>
+              <a:rPr lang="en-US" dirty="0" err="1"/>
               <a:t>TextView</a:t>
             </a:r>
             <a:r>
-              <a:rPr lang="en-US" dirty="0" smtClean="0"/>
+              <a:rPr lang="en-US" dirty="0"/>
               <a:t> – secret token</a:t>
             </a:r>
           </a:p>
@@ -3772,84 +3819,111 @@
           <a:lstStyle/>
           <a:p>
             <a:r>
-              <a:rPr lang="en-US" dirty="0" smtClean="0"/>
+              <a:rPr lang="en-US" dirty="0"/>
               <a:t>Administer Group</a:t>
             </a:r>
+          </a:p>
+        </p:txBody>
+      </p:sp>
+      <p:sp>
+        <p:nvSpPr>
+          <p:cNvPr id="3" name="Content Placeholder 2"/>
+          <p:cNvSpPr>
+            <a:spLocks noGrp="1"/>
+          </p:cNvSpPr>
+          <p:nvPr>
+            <p:ph idx="1"/>
+          </p:nvPr>
+        </p:nvSpPr>
+        <p:spPr/>
+        <p:txBody>
+          <a:bodyPr>
+            <a:normAutofit fontScale="92500" lnSpcReduction="20000"/>
+          </a:bodyPr>
+          <a:lstStyle/>
+          <a:p>
+            <a:r>
+              <a:rPr lang="en-US" dirty="0" err="1"/>
+              <a:t>TextView</a:t>
+            </a:r>
+            <a:r>
+              <a:rPr lang="en-US" dirty="0"/>
+              <a:t> – secret token</a:t>
+            </a:r>
+          </a:p>
+          <a:p>
+            <a:r>
+              <a:rPr lang="en-US" dirty="0"/>
+              <a:t>Button – Edit Categories</a:t>
+            </a:r>
+          </a:p>
+          <a:p>
+            <a:r>
+              <a:rPr lang="en-US" dirty="0"/>
+              <a:t>Spinner – Populated by spinner selection</a:t>
+            </a:r>
+          </a:p>
+          <a:p>
+            <a:pPr lvl="1"/>
+            <a:r>
+              <a:rPr lang="en-US" dirty="0"/>
+              <a:t>Image with profile photo</a:t>
+            </a:r>
+          </a:p>
+          <a:p>
+            <a:pPr lvl="1"/>
+            <a:r>
+              <a:rPr lang="en-US" dirty="0"/>
+              <a:t>Name</a:t>
+            </a:r>
+          </a:p>
+          <a:p>
+            <a:pPr lvl="1"/>
+            <a:r>
+              <a:rPr lang="en-US" dirty="0"/>
+              <a:t>Update and Delete Buttons</a:t>
+            </a:r>
+          </a:p>
+          <a:p>
+            <a:r>
+              <a:rPr lang="en-US" dirty="0"/>
+              <a:t>Edit Categories</a:t>
+            </a:r>
+          </a:p>
+          <a:p>
+            <a:pPr lvl="1"/>
+            <a:r>
+              <a:rPr lang="en-US" dirty="0" err="1"/>
+              <a:t>EditText</a:t>
+            </a:r>
+            <a:r>
+              <a:rPr lang="en-US" dirty="0"/>
+              <a:t> – Category Name</a:t>
+            </a:r>
+          </a:p>
+          <a:p>
+            <a:pPr lvl="1"/>
+            <a:r>
+              <a:rPr lang="en-US" dirty="0" err="1"/>
+              <a:t>EditText</a:t>
+            </a:r>
+            <a:r>
+              <a:rPr lang="en-US" dirty="0"/>
+              <a:t> – Monthly limit</a:t>
+            </a:r>
+          </a:p>
+          <a:p>
+            <a:pPr lvl="1"/>
+            <a:r>
+              <a:rPr lang="en-US" dirty="0"/>
+              <a:t>Update and Delete Buttons</a:t>
+            </a:r>
+          </a:p>
+          <a:p>
+            <a:pPr lvl="1"/>
             <a:endParaRPr lang="en-US" dirty="0"/>
           </a:p>
-        </p:txBody>
-      </p:sp>
-      <p:sp>
-        <p:nvSpPr>
-          <p:cNvPr id="3" name="Content Placeholder 2"/>
-          <p:cNvSpPr>
-            <a:spLocks noGrp="1"/>
-          </p:cNvSpPr>
-          <p:nvPr>
-            <p:ph idx="1"/>
-          </p:nvPr>
-        </p:nvSpPr>
-        <p:spPr/>
-        <p:txBody>
-          <a:bodyPr/>
-          <a:lstStyle/>
-          <a:p>
-            <a:r>
-              <a:rPr lang="en-US" dirty="0" err="1" smtClean="0"/>
-              <a:t>TextView</a:t>
-            </a:r>
-            <a:r>
-              <a:rPr lang="en-US" dirty="0" smtClean="0"/>
-              <a:t> – secret token</a:t>
-            </a:r>
-          </a:p>
-          <a:p>
-            <a:r>
-              <a:rPr lang="en-US" dirty="0" smtClean="0"/>
-              <a:t>Button – Edit Categories</a:t>
-            </a:r>
-          </a:p>
-          <a:p>
-            <a:r>
-              <a:rPr lang="en-US" dirty="0" err="1" smtClean="0"/>
-              <a:t>ListView</a:t>
-            </a:r>
-            <a:r>
-              <a:rPr lang="en-US" dirty="0" smtClean="0"/>
-              <a:t> – Populated by spinner selection</a:t>
-            </a:r>
-          </a:p>
-          <a:p>
-            <a:pPr lvl="1"/>
-            <a:r>
-              <a:rPr lang="en-US" dirty="0" smtClean="0"/>
-              <a:t>Image with profile photo</a:t>
-            </a:r>
-          </a:p>
-          <a:p>
-            <a:pPr lvl="1"/>
-            <a:r>
-              <a:rPr lang="en-US" dirty="0" smtClean="0"/>
-              <a:t>Name</a:t>
-            </a:r>
-          </a:p>
-          <a:p>
-            <a:pPr lvl="1"/>
-            <a:r>
-              <a:rPr lang="en-US" dirty="0" smtClean="0"/>
-              <a:t>Sling right to remove</a:t>
-            </a:r>
-          </a:p>
-          <a:p>
-            <a:pPr lvl="2"/>
-            <a:r>
-              <a:rPr lang="en-US" dirty="0" err="1" smtClean="0"/>
-              <a:t>Snackbar</a:t>
-            </a:r>
-            <a:r>
-              <a:rPr lang="en-US" dirty="0" smtClean="0"/>
-              <a:t> to cancel</a:t>
-            </a:r>
+          <a:p>
             <a:endParaRPr lang="en-US" dirty="0"/>
           </a:p>
         </p:txBody>
@@ -3900,10 +3974,9 @@
           <a:lstStyle/>
           <a:p>
             <a:r>
-              <a:rPr lang="en-US" dirty="0" smtClean="0"/>
-              <a:t>Edit Group Categories</a:t>
-            </a:r>
-            <a:endParaRPr lang="en-US" dirty="0"/>
+              <a:rPr lang="en-US" dirty="0"/>
+              <a:t>Join Group</a:t>
+            </a:r>
           </a:p>
         </p:txBody>
       </p:sp>
@@ -3923,33 +3996,33 @@
           <a:lstStyle/>
           <a:p>
             <a:r>
-              <a:rPr lang="en-US" dirty="0" err="1" smtClean="0"/>
+              <a:rPr lang="en-US" dirty="0" err="1"/>
               <a:t>EditText</a:t>
             </a:r>
             <a:r>
-              <a:rPr lang="en-US" dirty="0" smtClean="0"/>
-              <a:t> – Category Name</a:t>
-            </a:r>
-          </a:p>
-          <a:p>
-            <a:r>
-              <a:rPr lang="en-US" dirty="0" err="1" smtClean="0"/>
-              <a:t>EditText</a:t>
-            </a:r>
-            <a:r>
-              <a:rPr lang="en-US" dirty="0" smtClean="0"/>
-              <a:t> – Monthly limit</a:t>
-            </a:r>
-          </a:p>
-          <a:p>
-            <a:endParaRPr lang="en-US" dirty="0"/>
+              <a:rPr lang="en-US" dirty="0"/>
+              <a:t> – secret token</a:t>
+            </a:r>
+          </a:p>
+          <a:p>
+            <a:r>
+              <a:rPr lang="en-US" dirty="0"/>
+              <a:t>Button – join</a:t>
+            </a:r>
+          </a:p>
+          <a:p>
+            <a:pPr lvl="1"/>
+            <a:r>
+              <a:rPr lang="en-US" dirty="0"/>
+              <a:t>Adds category for user with a default limit</a:t>
+            </a:r>
           </a:p>
         </p:txBody>
       </p:sp>
     </p:spTree>
     <p:extLst>
       <p:ext uri="{BB962C8B-B14F-4D97-AF65-F5344CB8AC3E}">
-        <p14:creationId xmlns:p14="http://schemas.microsoft.com/office/powerpoint/2010/main" val="628164929"/>
+        <p14:creationId xmlns:p14="http://schemas.microsoft.com/office/powerpoint/2010/main" val="2717334282"/>
       </p:ext>
     </p:extLst>
   </p:cSld>
@@ -3992,10 +4065,9 @@
           <a:lstStyle/>
           <a:p>
             <a:r>
-              <a:rPr lang="en-US" dirty="0" smtClean="0"/>
-              <a:t>Join Group</a:t>
-            </a:r>
-            <a:endParaRPr lang="en-US" dirty="0"/>
+              <a:rPr lang="en-US" dirty="0"/>
+              <a:t>View Spending</a:t>
+            </a:r>
           </a:p>
         </p:txBody>
       </p:sp>
@@ -4015,34 +4087,63 @@
           <a:lstStyle/>
           <a:p>
             <a:r>
-              <a:rPr lang="en-US" dirty="0" err="1" smtClean="0"/>
-              <a:t>EditText</a:t>
-            </a:r>
-            <a:r>
-              <a:rPr lang="en-US" dirty="0" smtClean="0"/>
-              <a:t> – secret token</a:t>
-            </a:r>
-          </a:p>
-          <a:p>
-            <a:r>
-              <a:rPr lang="en-US" dirty="0" smtClean="0"/>
-              <a:t>Button – join</a:t>
+              <a:rPr lang="en-US" dirty="0" err="1"/>
+              <a:t>DateTimePicker</a:t>
+            </a:r>
+            <a:r>
+              <a:rPr lang="en-US" dirty="0"/>
+              <a:t> for start</a:t>
             </a:r>
           </a:p>
           <a:p>
             <a:pPr lvl="1"/>
             <a:r>
-              <a:rPr lang="en-US" dirty="0" smtClean="0"/>
-              <a:t>Adds category for user with a default limit</a:t>
-            </a:r>
-            <a:endParaRPr lang="en-US" dirty="0"/>
+              <a:rPr lang="en-US" dirty="0"/>
+              <a:t>Default to start of current month</a:t>
+            </a:r>
+          </a:p>
+          <a:p>
+            <a:r>
+              <a:rPr lang="en-US" dirty="0" err="1"/>
+              <a:t>DateTimePicker</a:t>
+            </a:r>
+            <a:r>
+              <a:rPr lang="en-US" dirty="0"/>
+              <a:t> for end</a:t>
+            </a:r>
+          </a:p>
+          <a:p>
+            <a:pPr lvl="1"/>
+            <a:r>
+              <a:rPr lang="en-US" dirty="0"/>
+              <a:t>Default to current day</a:t>
+            </a:r>
+          </a:p>
+          <a:p>
+            <a:r>
+              <a:rPr lang="en-US" dirty="0"/>
+              <a:t>Spinner to choose category</a:t>
+            </a:r>
+          </a:p>
+          <a:p>
+            <a:pPr marL="742950" lvl="2" indent="-342900"/>
+            <a:r>
+              <a:rPr lang="en-US" dirty="0"/>
+              <a:t>Spinner has all or individual</a:t>
+            </a:r>
+          </a:p>
+          <a:p>
+            <a:r>
+              <a:rPr lang="en-US" dirty="0"/>
+              <a:t>Button to submit</a:t>
+            </a:r>
           </a:p>
         </p:txBody>
       </p:sp>
     </p:spTree>
     <p:extLst>
       <p:ext uri="{BB962C8B-B14F-4D97-AF65-F5344CB8AC3E}">
-        <p14:creationId xmlns:p14="http://schemas.microsoft.com/office/powerpoint/2010/main" val="2717334282"/>
+        <p14:creationId xmlns:p14="http://schemas.microsoft.com/office/powerpoint/2010/main" val="3163152585"/>
       </p:ext>
     </p:extLst>
   </p:cSld>
@@ -4085,87 +4186,39 @@
           <a:lstStyle/>
           <a:p>
             <a:r>
-              <a:rPr lang="en-US" dirty="0" smtClean="0"/>
-              <a:t>View Spending</a:t>
+              <a:rPr lang="en-US" dirty="0"/>
+              <a:t>Search Results</a:t>
+            </a:r>
+          </a:p>
+        </p:txBody>
+      </p:sp>
+      <p:sp>
+        <p:nvSpPr>
+          <p:cNvPr id="3" name="Content Placeholder 2"/>
+          <p:cNvSpPr>
+            <a:spLocks noGrp="1"/>
+          </p:cNvSpPr>
+          <p:nvPr>
+            <p:ph idx="1"/>
+          </p:nvPr>
+        </p:nvSpPr>
+        <p:spPr/>
+        <p:txBody>
+          <a:bodyPr/>
+          <a:lstStyle/>
+          <a:p>
+            <a:r>
+              <a:rPr lang="en-US" dirty="0" err="1"/>
+              <a:t>ListView</a:t>
             </a:r>
             <a:endParaRPr lang="en-US" dirty="0"/>
-          </a:p>
-        </p:txBody>
-      </p:sp>
-      <p:sp>
-        <p:nvSpPr>
-          <p:cNvPr id="3" name="Content Placeholder 2"/>
-          <p:cNvSpPr>
-            <a:spLocks noGrp="1"/>
-          </p:cNvSpPr>
-          <p:nvPr>
-            <p:ph idx="1"/>
-          </p:nvPr>
-        </p:nvSpPr>
-        <p:spPr/>
-        <p:txBody>
-          <a:bodyPr/>
-          <a:lstStyle/>
-          <a:p>
-            <a:r>
-              <a:rPr lang="en-US" dirty="0" err="1" smtClean="0"/>
-              <a:t>DateTimePicker</a:t>
-            </a:r>
-            <a:r>
-              <a:rPr lang="en-US" dirty="0" smtClean="0"/>
-              <a:t> for start</a:t>
-            </a:r>
-          </a:p>
-          <a:p>
-            <a:pPr lvl="1"/>
-            <a:r>
-              <a:rPr lang="en-US" dirty="0" smtClean="0"/>
-              <a:t>Default to start of current month</a:t>
-            </a:r>
-          </a:p>
-          <a:p>
-            <a:r>
-              <a:rPr lang="en-US" dirty="0" err="1" smtClean="0"/>
-              <a:t>DateTimePicker</a:t>
-            </a:r>
-            <a:r>
-              <a:rPr lang="en-US" dirty="0" smtClean="0"/>
-              <a:t> for end</a:t>
-            </a:r>
-          </a:p>
-          <a:p>
-            <a:pPr lvl="1"/>
-            <a:r>
-              <a:rPr lang="en-US" dirty="0" smtClean="0"/>
-              <a:t>Default to current day</a:t>
-            </a:r>
-          </a:p>
-          <a:p>
-            <a:r>
-              <a:rPr lang="en-US" dirty="0" smtClean="0"/>
-              <a:t>Spinner to choose category</a:t>
-            </a:r>
-          </a:p>
-          <a:p>
-            <a:pPr marL="742950" lvl="2" indent="-342900"/>
-            <a:r>
-              <a:rPr lang="en-US" dirty="0" smtClean="0"/>
-              <a:t>Spinner has all or individual</a:t>
-            </a:r>
-            <a:endParaRPr lang="en-US" dirty="0" smtClean="0"/>
-          </a:p>
-          <a:p>
-            <a:r>
-              <a:rPr lang="en-US" dirty="0" smtClean="0"/>
-              <a:t>Button to submit</a:t>
-            </a:r>
           </a:p>
         </p:txBody>
       </p:sp>
     </p:spTree>
     <p:extLst>
       <p:ext uri="{BB962C8B-B14F-4D97-AF65-F5344CB8AC3E}">
-        <p14:creationId xmlns:p14="http://schemas.microsoft.com/office/powerpoint/2010/main" val="3163152585"/>
+        <p14:creationId xmlns:p14="http://schemas.microsoft.com/office/powerpoint/2010/main" val="1455448113"/>
       </p:ext>
     </p:extLst>
   </p:cSld>
@@ -4208,10 +4261,9 @@
           <a:lstStyle/>
           <a:p>
             <a:r>
-              <a:rPr lang="en-US" dirty="0" smtClean="0"/>
-              <a:t>Search Results</a:t>
-            </a:r>
-            <a:endParaRPr lang="en-US" dirty="0"/>
+              <a:rPr lang="en-US" dirty="0"/>
+              <a:t>Submit Receipt</a:t>
+            </a:r>
           </a:p>
         </p:txBody>
       </p:sp>
@@ -4231,17 +4283,55 @@
           <a:lstStyle/>
           <a:p>
             <a:r>
-              <a:rPr lang="en-US" dirty="0" err="1" smtClean="0"/>
-              <a:t>ListView</a:t>
-            </a:r>
-            <a:endParaRPr lang="en-US" dirty="0"/>
+              <a:rPr lang="en-US" dirty="0"/>
+              <a:t>Spinner for category</a:t>
+            </a:r>
+          </a:p>
+          <a:p>
+            <a:r>
+              <a:rPr lang="en-US" dirty="0" err="1"/>
+              <a:t>EditText</a:t>
+            </a:r>
+            <a:r>
+              <a:rPr lang="en-US" dirty="0"/>
+              <a:t> for amount</a:t>
+            </a:r>
+          </a:p>
+          <a:p>
+            <a:r>
+              <a:rPr lang="en-US" dirty="0" err="1"/>
+              <a:t>ImageView</a:t>
+            </a:r>
+            <a:r>
+              <a:rPr lang="en-US" dirty="0"/>
+              <a:t> for receipt</a:t>
+            </a:r>
+          </a:p>
+          <a:p>
+            <a:r>
+              <a:rPr lang="en-US" dirty="0"/>
+              <a:t>Button</a:t>
+            </a:r>
+          </a:p>
+          <a:p>
+            <a:pPr lvl="1"/>
+            <a:r>
+              <a:rPr lang="en-US" dirty="0"/>
+              <a:t>Browse for receipt or take a picture</a:t>
+            </a:r>
+          </a:p>
+          <a:p>
+            <a:r>
+              <a:rPr lang="en-US" dirty="0"/>
+              <a:t>Button to submit</a:t>
+            </a:r>
           </a:p>
         </p:txBody>
       </p:sp>
     </p:spTree>
     <p:extLst>
       <p:ext uri="{BB962C8B-B14F-4D97-AF65-F5344CB8AC3E}">
-        <p14:creationId xmlns:p14="http://schemas.microsoft.com/office/powerpoint/2010/main" val="1455448113"/>
+        <p14:creationId xmlns:p14="http://schemas.microsoft.com/office/powerpoint/2010/main" val="535213632"/>
       </p:ext>
     </p:extLst>
   </p:cSld>

</xml_diff>

<commit_message>
Updates for Lab 7
</commit_message>
<xml_diff>
--- a/ProjectLayouts.pptx
+++ b/ProjectLayouts.pptx
@@ -8,14 +8,14 @@
     <p:sldId id="257" r:id="rId2"/>
     <p:sldId id="258" r:id="rId3"/>
     <p:sldId id="259" r:id="rId4"/>
-    <p:sldId id="260" r:id="rId5"/>
-    <p:sldId id="261" r:id="rId6"/>
+    <p:sldId id="269" r:id="rId5"/>
+    <p:sldId id="260" r:id="rId6"/>
     <p:sldId id="263" r:id="rId7"/>
-    <p:sldId id="264" r:id="rId8"/>
-    <p:sldId id="265" r:id="rId9"/>
-    <p:sldId id="266" r:id="rId10"/>
-    <p:sldId id="267" r:id="rId11"/>
-    <p:sldId id="262" r:id="rId12"/>
+    <p:sldId id="261" r:id="rId8"/>
+    <p:sldId id="266" r:id="rId9"/>
+    <p:sldId id="264" r:id="rId10"/>
+    <p:sldId id="265" r:id="rId11"/>
+    <p:sldId id="267" r:id="rId12"/>
   </p:sldIdLst>
   <p:sldSz cx="9144000" cy="6858000" type="screen4x3"/>
   <p:notesSz cx="6858000" cy="9144000"/>
@@ -116,7 +116,7 @@
   </p:defaultTextStyle>
   <p:extLst>
     <p:ext uri="{EFAFB233-063F-42B5-8137-9DF3F51BA10A}">
-      <p15:sldGuideLst xmlns:p15="http://schemas.microsoft.com/office/powerpoint/2012/main">
+      <p15:sldGuideLst xmlns:p15="http://schemas.microsoft.com/office/powerpoint/2012/main" xmlns="">
         <p15:guide id="1" orient="horz" pos="2160">
           <p15:clr>
             <a:srgbClr val="A4A3A4"/>
@@ -312,7 +312,7 @@
           <a:p>
             <a:fld id="{566A6A97-3DE1-4BF9-B118-F24947EF4732}" type="datetimeFigureOut">
               <a:rPr lang="en-US" smtClean="0"/>
-              <a:t>11/23/2019</a:t>
+              <a:t>11/24/2019</a:t>
             </a:fld>
             <a:endParaRPr lang="en-US"/>
           </a:p>
@@ -480,7 +480,7 @@
           <a:p>
             <a:fld id="{566A6A97-3DE1-4BF9-B118-F24947EF4732}" type="datetimeFigureOut">
               <a:rPr lang="en-US" smtClean="0"/>
-              <a:t>11/23/2019</a:t>
+              <a:t>11/24/2019</a:t>
             </a:fld>
             <a:endParaRPr lang="en-US"/>
           </a:p>
@@ -658,7 +658,7 @@
           <a:p>
             <a:fld id="{566A6A97-3DE1-4BF9-B118-F24947EF4732}" type="datetimeFigureOut">
               <a:rPr lang="en-US" smtClean="0"/>
-              <a:t>11/23/2019</a:t>
+              <a:t>11/24/2019</a:t>
             </a:fld>
             <a:endParaRPr lang="en-US"/>
           </a:p>
@@ -826,7 +826,7 @@
           <a:p>
             <a:fld id="{566A6A97-3DE1-4BF9-B118-F24947EF4732}" type="datetimeFigureOut">
               <a:rPr lang="en-US" smtClean="0"/>
-              <a:t>11/23/2019</a:t>
+              <a:t>11/24/2019</a:t>
             </a:fld>
             <a:endParaRPr lang="en-US"/>
           </a:p>
@@ -1071,7 +1071,7 @@
           <a:p>
             <a:fld id="{566A6A97-3DE1-4BF9-B118-F24947EF4732}" type="datetimeFigureOut">
               <a:rPr lang="en-US" smtClean="0"/>
-              <a:t>11/23/2019</a:t>
+              <a:t>11/24/2019</a:t>
             </a:fld>
             <a:endParaRPr lang="en-US"/>
           </a:p>
@@ -1356,7 +1356,7 @@
           <a:p>
             <a:fld id="{566A6A97-3DE1-4BF9-B118-F24947EF4732}" type="datetimeFigureOut">
               <a:rPr lang="en-US" smtClean="0"/>
-              <a:t>11/23/2019</a:t>
+              <a:t>11/24/2019</a:t>
             </a:fld>
             <a:endParaRPr lang="en-US"/>
           </a:p>
@@ -1775,7 +1775,7 @@
           <a:p>
             <a:fld id="{566A6A97-3DE1-4BF9-B118-F24947EF4732}" type="datetimeFigureOut">
               <a:rPr lang="en-US" smtClean="0"/>
-              <a:t>11/23/2019</a:t>
+              <a:t>11/24/2019</a:t>
             </a:fld>
             <a:endParaRPr lang="en-US"/>
           </a:p>
@@ -1892,7 +1892,7 @@
           <a:p>
             <a:fld id="{566A6A97-3DE1-4BF9-B118-F24947EF4732}" type="datetimeFigureOut">
               <a:rPr lang="en-US" smtClean="0"/>
-              <a:t>11/23/2019</a:t>
+              <a:t>11/24/2019</a:t>
             </a:fld>
             <a:endParaRPr lang="en-US"/>
           </a:p>
@@ -1987,7 +1987,7 @@
           <a:p>
             <a:fld id="{566A6A97-3DE1-4BF9-B118-F24947EF4732}" type="datetimeFigureOut">
               <a:rPr lang="en-US" smtClean="0"/>
-              <a:t>11/23/2019</a:t>
+              <a:t>11/24/2019</a:t>
             </a:fld>
             <a:endParaRPr lang="en-US"/>
           </a:p>
@@ -2262,7 +2262,7 @@
           <a:p>
             <a:fld id="{566A6A97-3DE1-4BF9-B118-F24947EF4732}" type="datetimeFigureOut">
               <a:rPr lang="en-US" smtClean="0"/>
-              <a:t>11/23/2019</a:t>
+              <a:t>11/24/2019</a:t>
             </a:fld>
             <a:endParaRPr lang="en-US"/>
           </a:p>
@@ -2514,7 +2514,7 @@
           <a:p>
             <a:fld id="{566A6A97-3DE1-4BF9-B118-F24947EF4732}" type="datetimeFigureOut">
               <a:rPr lang="en-US" smtClean="0"/>
-              <a:t>11/23/2019</a:t>
+              <a:t>11/24/2019</a:t>
             </a:fld>
             <a:endParaRPr lang="en-US"/>
           </a:p>
@@ -2725,7 +2725,7 @@
           <a:p>
             <a:fld id="{566A6A97-3DE1-4BF9-B118-F24947EF4732}" type="datetimeFigureOut">
               <a:rPr lang="en-US" smtClean="0"/>
-              <a:t>11/23/2019</a:t>
+              <a:t>11/24/2019</a:t>
             </a:fld>
             <a:endParaRPr lang="en-US"/>
           </a:p>
@@ -3165,8 +3165,12 @@
           <a:p>
             <a:pPr lvl="1"/>
             <a:r>
-              <a:rPr lang="en-US" dirty="0"/>
-              <a:t>Sends Username and Password to database and returns success or failure</a:t>
+              <a:rPr lang="en-US" dirty="0" smtClean="0"/>
+              <a:t>Shows dialog indicating </a:t>
+            </a:r>
+            <a:r>
+              <a:rPr lang="en-US" dirty="0"/>
+              <a:t>success or failure</a:t>
             </a:r>
           </a:p>
           <a:p>
@@ -3176,15 +3180,32 @@
             </a:r>
             <a:r>
               <a:rPr lang="en-US" dirty="0"/>
-              <a:t> styled as Hyperlink – Register</a:t>
+              <a:t> styled </a:t>
+            </a:r>
+            <a:r>
+              <a:rPr lang="en-US" dirty="0" smtClean="0"/>
+              <a:t>in red </a:t>
+            </a:r>
+            <a:r>
+              <a:rPr lang="en-US" dirty="0"/>
+              <a:t>– Register</a:t>
             </a:r>
           </a:p>
           <a:p>
             <a:pPr lvl="1"/>
             <a:r>
-              <a:rPr lang="en-US" dirty="0"/>
-              <a:t>Go to profile activity</a:t>
-            </a:r>
+              <a:rPr lang="en-US" dirty="0" smtClean="0"/>
+              <a:t>Goes </a:t>
+            </a:r>
+            <a:r>
+              <a:rPr lang="en-US" dirty="0"/>
+              <a:t>to </a:t>
+            </a:r>
+            <a:r>
+              <a:rPr lang="en-US" dirty="0" smtClean="0"/>
+              <a:t>register activity</a:t>
+            </a:r>
+            <a:endParaRPr lang="en-US" dirty="0"/>
           </a:p>
         </p:txBody>
       </p:sp>
@@ -3220,13 +3241,7 @@
       </p:grpSpPr>
       <p:sp>
         <p:nvSpPr>
-          <p:cNvPr id="2" name="Title 1">
-            <a:extLst>
-              <a:ext uri="{FF2B5EF4-FFF2-40B4-BE49-F238E27FC236}">
-                <a16:creationId xmlns:a16="http://schemas.microsoft.com/office/drawing/2014/main" id="{4452320C-D5FF-4041-B9CE-91C19F5D427E}"/>
-              </a:ext>
-            </a:extLst>
-          </p:cNvPr>
+          <p:cNvPr id="2" name="Title 1"/>
           <p:cNvSpPr>
             <a:spLocks noGrp="1"/>
           </p:cNvSpPr>
@@ -3241,20 +3256,14 @@
           <a:p>
             <a:r>
               <a:rPr lang="en-US" dirty="0"/>
-              <a:t>Backup</a:t>
-            </a:r>
-          </a:p>
-        </p:txBody>
-      </p:sp>
-      <p:sp>
-        <p:nvSpPr>
-          <p:cNvPr id="3" name="Content Placeholder 2">
-            <a:extLst>
-              <a:ext uri="{FF2B5EF4-FFF2-40B4-BE49-F238E27FC236}">
-                <a16:creationId xmlns:a16="http://schemas.microsoft.com/office/drawing/2014/main" id="{234B904D-9E3D-4A4B-B1AD-BD9C8DB4C56A}"/>
-              </a:ext>
-            </a:extLst>
-          </p:cNvPr>
+              <a:t>Search Results</a:t>
+            </a:r>
+          </a:p>
+        </p:txBody>
+      </p:sp>
+      <p:sp>
+        <p:nvSpPr>
+          <p:cNvPr id="3" name="Content Placeholder 2"/>
           <p:cNvSpPr>
             <a:spLocks noGrp="1"/>
           </p:cNvSpPr>
@@ -3267,14 +3276,18 @@
           <a:bodyPr/>
           <a:lstStyle/>
           <a:p>
-            <a:endParaRPr lang="en-US"/>
+            <a:r>
+              <a:rPr lang="en-US" dirty="0" err="1"/>
+              <a:t>ListView</a:t>
+            </a:r>
+            <a:endParaRPr lang="en-US" dirty="0"/>
           </a:p>
         </p:txBody>
       </p:sp>
     </p:spTree>
     <p:extLst>
       <p:ext uri="{BB962C8B-B14F-4D97-AF65-F5344CB8AC3E}">
-        <p14:creationId xmlns:p14="http://schemas.microsoft.com/office/powerpoint/2010/main" val="3436432575"/>
+        <p14:creationId xmlns:p14="http://schemas.microsoft.com/office/powerpoint/2010/main" val="1455448113"/>
       </p:ext>
     </p:extLst>
   </p:cSld>
@@ -3303,7 +3316,13 @@
       </p:grpSpPr>
       <p:sp>
         <p:nvSpPr>
-          <p:cNvPr id="2" name="Title 1"/>
+          <p:cNvPr id="2" name="Title 1">
+            <a:extLst>
+              <a:ext uri="{FF2B5EF4-FFF2-40B4-BE49-F238E27FC236}">
+                <a16:creationId xmlns:a16="http://schemas.microsoft.com/office/drawing/2014/main" xmlns="" id="{4452320C-D5FF-4041-B9CE-91C19F5D427E}"/>
+              </a:ext>
+            </a:extLst>
+          </p:cNvPr>
           <p:cNvSpPr>
             <a:spLocks noGrp="1"/>
           </p:cNvSpPr>
@@ -3318,14 +3337,20 @@
           <a:p>
             <a:r>
               <a:rPr lang="en-US" dirty="0"/>
-              <a:t>Edit Group Categories</a:t>
-            </a:r>
-          </a:p>
-        </p:txBody>
-      </p:sp>
-      <p:sp>
-        <p:nvSpPr>
-          <p:cNvPr id="3" name="Content Placeholder 2"/>
+              <a:t>Backup</a:t>
+            </a:r>
+          </a:p>
+        </p:txBody>
+      </p:sp>
+      <p:sp>
+        <p:nvSpPr>
+          <p:cNvPr id="3" name="Content Placeholder 2">
+            <a:extLst>
+              <a:ext uri="{FF2B5EF4-FFF2-40B4-BE49-F238E27FC236}">
+                <a16:creationId xmlns:a16="http://schemas.microsoft.com/office/drawing/2014/main" xmlns="" id="{234B904D-9E3D-4A4B-B1AD-BD9C8DB4C56A}"/>
+              </a:ext>
+            </a:extLst>
+          </p:cNvPr>
           <p:cNvSpPr>
             <a:spLocks noGrp="1"/>
           </p:cNvSpPr>
@@ -3338,34 +3363,14 @@
           <a:bodyPr/>
           <a:lstStyle/>
           <a:p>
-            <a:r>
-              <a:rPr lang="en-US" dirty="0" err="1"/>
-              <a:t>EditText</a:t>
-            </a:r>
-            <a:r>
-              <a:rPr lang="en-US" dirty="0"/>
-              <a:t> – Category Name</a:t>
-            </a:r>
-          </a:p>
-          <a:p>
-            <a:r>
-              <a:rPr lang="en-US" dirty="0" err="1"/>
-              <a:t>EditText</a:t>
-            </a:r>
-            <a:r>
-              <a:rPr lang="en-US" dirty="0"/>
-              <a:t> – Monthly limit</a:t>
-            </a:r>
-          </a:p>
-          <a:p>
-            <a:endParaRPr lang="en-US" dirty="0"/>
+            <a:endParaRPr lang="en-US"/>
           </a:p>
         </p:txBody>
       </p:sp>
     </p:spTree>
     <p:extLst>
       <p:ext uri="{BB962C8B-B14F-4D97-AF65-F5344CB8AC3E}">
-        <p14:creationId xmlns:p14="http://schemas.microsoft.com/office/powerpoint/2010/main" val="628164929"/>
+        <p14:creationId xmlns:p14="http://schemas.microsoft.com/office/powerpoint/2010/main" val="3436432575"/>
       </p:ext>
     </p:extLst>
   </p:cSld>
@@ -3408,9 +3413,10 @@
           <a:lstStyle/>
           <a:p>
             <a:r>
-              <a:rPr lang="en-US" dirty="0"/>
-              <a:t>Profile</a:t>
-            </a:r>
+              <a:rPr lang="en-US" dirty="0" smtClean="0"/>
+              <a:t>Register/Profile</a:t>
+            </a:r>
+            <a:endParaRPr lang="en-US" dirty="0"/>
           </a:p>
         </p:txBody>
       </p:sp>
@@ -3427,9 +3433,36 @@
         <p:spPr/>
         <p:txBody>
           <a:bodyPr>
-            <a:normAutofit fontScale="85000" lnSpcReduction="20000"/>
+            <a:normAutofit fontScale="70000" lnSpcReduction="20000"/>
           </a:bodyPr>
           <a:lstStyle/>
+          <a:p>
+            <a:r>
+              <a:rPr lang="en-US" dirty="0" smtClean="0"/>
+              <a:t>Register Activity doesn’t show Navigation Drawer and App Bar</a:t>
+            </a:r>
+          </a:p>
+          <a:p>
+            <a:r>
+              <a:rPr lang="en-US" dirty="0" smtClean="0"/>
+              <a:t>Profile Activity shows Navigation Drawer and App Bar</a:t>
+            </a:r>
+            <a:endParaRPr lang="en-US" dirty="0" smtClean="0"/>
+          </a:p>
+          <a:p>
+            <a:r>
+              <a:rPr lang="en-US" dirty="0" err="1" smtClean="0"/>
+              <a:t>EditText</a:t>
+            </a:r>
+            <a:r>
+              <a:rPr lang="en-US" dirty="0" smtClean="0"/>
+              <a:t> </a:t>
+            </a:r>
+            <a:r>
+              <a:rPr lang="en-US" dirty="0"/>
+              <a:t>– Username</a:t>
+            </a:r>
+          </a:p>
           <a:p>
             <a:r>
               <a:rPr lang="en-US" dirty="0" err="1"/>
@@ -3437,7 +3470,7 @@
             </a:r>
             <a:r>
               <a:rPr lang="en-US" dirty="0"/>
-              <a:t> – Username</a:t>
+              <a:t> – Password</a:t>
             </a:r>
           </a:p>
           <a:p>
@@ -3447,7 +3480,7 @@
             </a:r>
             <a:r>
               <a:rPr lang="en-US" dirty="0"/>
-              <a:t> – Password</a:t>
+              <a:t> – City</a:t>
             </a:r>
           </a:p>
           <a:p>
@@ -3457,16 +3490,6 @@
             </a:r>
             <a:r>
               <a:rPr lang="en-US" dirty="0"/>
-              <a:t> – City</a:t>
-            </a:r>
-          </a:p>
-          <a:p>
-            <a:r>
-              <a:rPr lang="en-US" dirty="0" err="1"/>
-              <a:t>EditText</a:t>
-            </a:r>
-            <a:r>
-              <a:rPr lang="en-US" dirty="0"/>
               <a:t> – State</a:t>
             </a:r>
           </a:p>
@@ -3483,8 +3506,13 @@
           <a:p>
             <a:r>
               <a:rPr lang="en-US" dirty="0"/>
-              <a:t>Button – Upload Picture</a:t>
-            </a:r>
+              <a:t>Button – Upload </a:t>
+            </a:r>
+            <a:r>
+              <a:rPr lang="en-US" dirty="0" smtClean="0"/>
+              <a:t>Photo</a:t>
+            </a:r>
+            <a:endParaRPr lang="en-US" dirty="0"/>
           </a:p>
           <a:p>
             <a:pPr lvl="1"/>
@@ -3496,8 +3524,13 @@
           <a:p>
             <a:r>
               <a:rPr lang="en-US" dirty="0"/>
-              <a:t>Button – Submit</a:t>
-            </a:r>
+              <a:t>Button – </a:t>
+            </a:r>
+            <a:r>
+              <a:rPr lang="en-US" dirty="0" smtClean="0"/>
+              <a:t>Save Profile</a:t>
+            </a:r>
+            <a:endParaRPr lang="en-US" dirty="0"/>
           </a:p>
           <a:p>
             <a:pPr lvl="1"/>
@@ -3510,14 +3543,42 @@
             <a:pPr lvl="1"/>
             <a:r>
               <a:rPr lang="en-US" dirty="0"/>
-              <a:t>Show alert dialog on failure</a:t>
+              <a:t>Show </a:t>
+            </a:r>
+            <a:r>
+              <a:rPr lang="en-US" dirty="0" smtClean="0"/>
+              <a:t>dialog indicating success or </a:t>
+            </a:r>
+            <a:r>
+              <a:rPr lang="en-US" dirty="0"/>
+              <a:t>failure</a:t>
             </a:r>
           </a:p>
           <a:p>
             <a:pPr lvl="1"/>
             <a:r>
-              <a:rPr lang="en-US" dirty="0"/>
-              <a:t>Go to Login on success</a:t>
+              <a:rPr lang="en-US" dirty="0" smtClean="0"/>
+              <a:t>Register Activity goes</a:t>
+            </a:r>
+            <a:r>
+              <a:rPr lang="en-US" dirty="0" smtClean="0"/>
+              <a:t> </a:t>
+            </a:r>
+            <a:r>
+              <a:rPr lang="en-US" dirty="0"/>
+              <a:t>to </a:t>
+            </a:r>
+            <a:r>
+              <a:rPr lang="en-US" dirty="0" smtClean="0"/>
+              <a:t>Main Activity</a:t>
+            </a:r>
+            <a:r>
+              <a:rPr lang="en-US" dirty="0" smtClean="0"/>
+              <a:t> </a:t>
+            </a:r>
+            <a:r>
+              <a:rPr lang="en-US" dirty="0"/>
+              <a:t>on success</a:t>
             </a:r>
           </a:p>
         </p:txBody>
@@ -3568,9 +3629,10 @@
           <a:lstStyle/>
           <a:p>
             <a:r>
-              <a:rPr lang="en-US" dirty="0"/>
-              <a:t>Opening Activity after Login</a:t>
-            </a:r>
+              <a:rPr lang="en-US" dirty="0" smtClean="0"/>
+              <a:t>Navigation Drawer and App Bar</a:t>
+            </a:r>
+            <a:endParaRPr lang="en-US" dirty="0"/>
           </a:p>
         </p:txBody>
       </p:sp>
@@ -3587,13 +3649,55 @@
         <p:spPr/>
         <p:txBody>
           <a:bodyPr>
-            <a:normAutofit fontScale="92500" lnSpcReduction="10000"/>
+            <a:normAutofit fontScale="92500" lnSpcReduction="20000"/>
           </a:bodyPr>
           <a:lstStyle/>
           <a:p>
             <a:r>
-              <a:rPr lang="en-US" dirty="0" err="1"/>
-              <a:t>AppBar</a:t>
+              <a:rPr lang="en-US" dirty="0" smtClean="0"/>
+              <a:t>Navigation Drawer and App Bar shown for each activity</a:t>
+            </a:r>
+          </a:p>
+          <a:p>
+            <a:r>
+              <a:rPr lang="en-US" dirty="0" smtClean="0"/>
+              <a:t>Navigation </a:t>
+            </a:r>
+            <a:r>
+              <a:rPr lang="en-US" dirty="0"/>
+              <a:t>Drawer</a:t>
+            </a:r>
+          </a:p>
+          <a:p>
+            <a:pPr lvl="1"/>
+            <a:r>
+              <a:rPr lang="en-US" dirty="0"/>
+              <a:t>Create Group</a:t>
+            </a:r>
+          </a:p>
+          <a:p>
+            <a:pPr lvl="1"/>
+            <a:r>
+              <a:rPr lang="en-US" dirty="0"/>
+              <a:t>Join Group</a:t>
+            </a:r>
+          </a:p>
+          <a:p>
+            <a:pPr lvl="1"/>
+            <a:r>
+              <a:rPr lang="en-US" dirty="0"/>
+              <a:t>Leave Group</a:t>
+            </a:r>
+          </a:p>
+          <a:p>
+            <a:pPr lvl="1"/>
+            <a:r>
+              <a:rPr lang="en-US" dirty="0"/>
+              <a:t>Administer </a:t>
+            </a:r>
+            <a:r>
+              <a:rPr lang="en-US" dirty="0" smtClean="0"/>
+              <a:t>Group</a:t>
             </a:r>
             <a:endParaRPr lang="en-US" dirty="0"/>
           </a:p>
@@ -3601,63 +3705,43 @@
             <a:pPr lvl="1"/>
             <a:r>
               <a:rPr lang="en-US" dirty="0"/>
-              <a:t>Settings Icon (Gear)</a:t>
-            </a:r>
+              <a:t>Submit Receipt</a:t>
+            </a:r>
+          </a:p>
+          <a:p>
+            <a:r>
+              <a:rPr lang="en-US" dirty="0" smtClean="0"/>
+              <a:t>App Bar</a:t>
+            </a:r>
+            <a:endParaRPr lang="en-US" dirty="0"/>
+          </a:p>
+          <a:p>
+            <a:pPr lvl="1"/>
+            <a:r>
+              <a:rPr lang="en-US" dirty="0" smtClean="0"/>
+              <a:t>Profile Icon</a:t>
+            </a:r>
+            <a:endParaRPr lang="en-US" dirty="0"/>
           </a:p>
           <a:p>
             <a:pPr lvl="2"/>
             <a:r>
-              <a:rPr lang="en-US" dirty="0"/>
-              <a:t>Takes you to profile page</a:t>
-            </a:r>
-          </a:p>
-          <a:p>
-            <a:r>
-              <a:rPr lang="en-US" dirty="0"/>
-              <a:t>Navigation Drawer</a:t>
-            </a:r>
-          </a:p>
-          <a:p>
-            <a:pPr lvl="1"/>
-            <a:r>
-              <a:rPr lang="en-US" dirty="0"/>
-              <a:t>Administer Group</a:t>
-            </a:r>
-          </a:p>
-          <a:p>
-            <a:pPr lvl="2"/>
-            <a:r>
-              <a:rPr lang="en-US" dirty="0"/>
-              <a:t>Will only show if you’re the owner</a:t>
-            </a:r>
-          </a:p>
-          <a:p>
-            <a:pPr lvl="1"/>
-            <a:r>
-              <a:rPr lang="en-US" dirty="0"/>
-              <a:t>Create Group</a:t>
-            </a:r>
-          </a:p>
-          <a:p>
-            <a:pPr lvl="1"/>
-            <a:r>
-              <a:rPr lang="en-US" dirty="0"/>
-              <a:t>Join Group</a:t>
-            </a:r>
-          </a:p>
-          <a:p>
-            <a:pPr lvl="1"/>
-            <a:r>
-              <a:rPr lang="en-US" dirty="0"/>
-              <a:t>Leave Group</a:t>
-            </a:r>
-          </a:p>
-          <a:p>
-            <a:pPr lvl="1"/>
-            <a:r>
-              <a:rPr lang="en-US" dirty="0"/>
-              <a:t>Submit Receipt</a:t>
-            </a:r>
+              <a:rPr lang="en-US" dirty="0" smtClean="0"/>
+              <a:t>Goes</a:t>
+            </a:r>
+            <a:r>
+              <a:rPr lang="en-US" dirty="0" smtClean="0"/>
+              <a:t> </a:t>
+            </a:r>
+            <a:r>
+              <a:rPr lang="en-US" dirty="0"/>
+              <a:t>to </a:t>
+            </a:r>
+            <a:r>
+              <a:rPr lang="en-US" dirty="0" smtClean="0"/>
+              <a:t>Profile Activity</a:t>
+            </a:r>
+            <a:endParaRPr lang="en-US" dirty="0"/>
           </a:p>
           <a:p>
             <a:pPr lvl="2"/>
@@ -3711,72 +3795,86 @@
           <a:lstStyle/>
           <a:p>
             <a:r>
+              <a:rPr lang="en-US" dirty="0" smtClean="0"/>
+              <a:t>Main Activity</a:t>
+            </a:r>
+            <a:endParaRPr lang="en-US" dirty="0"/>
+          </a:p>
+        </p:txBody>
+      </p:sp>
+      <p:sp>
+        <p:nvSpPr>
+          <p:cNvPr id="3" name="Content Placeholder 2"/>
+          <p:cNvSpPr>
+            <a:spLocks noGrp="1"/>
+          </p:cNvSpPr>
+          <p:nvPr>
+            <p:ph idx="1"/>
+          </p:nvPr>
+        </p:nvSpPr>
+        <p:spPr/>
+        <p:txBody>
+          <a:bodyPr>
+            <a:normAutofit/>
+          </a:bodyPr>
+          <a:lstStyle/>
+          <a:p>
+            <a:r>
+              <a:rPr lang="en-US" dirty="0" smtClean="0"/>
+              <a:t>Buttons</a:t>
+            </a:r>
+            <a:endParaRPr lang="en-US" dirty="0"/>
+          </a:p>
+          <a:p>
+            <a:pPr lvl="1"/>
+            <a:r>
               <a:rPr lang="en-US" dirty="0"/>
               <a:t>Create Group</a:t>
             </a:r>
           </a:p>
-        </p:txBody>
-      </p:sp>
-      <p:sp>
-        <p:nvSpPr>
-          <p:cNvPr id="3" name="Content Placeholder 2"/>
-          <p:cNvSpPr>
-            <a:spLocks noGrp="1"/>
-          </p:cNvSpPr>
-          <p:nvPr>
-            <p:ph idx="1"/>
-          </p:nvPr>
-        </p:nvSpPr>
-        <p:spPr/>
-        <p:txBody>
-          <a:bodyPr/>
-          <a:lstStyle/>
-          <a:p>
-            <a:r>
-              <a:rPr lang="en-US" dirty="0" err="1"/>
-              <a:t>EditText</a:t>
-            </a:r>
-            <a:r>
-              <a:rPr lang="en-US" dirty="0"/>
-              <a:t> – group name</a:t>
-            </a:r>
-          </a:p>
-          <a:p>
-            <a:r>
-              <a:rPr lang="en-US" dirty="0"/>
-              <a:t>Button – create group</a:t>
-            </a:r>
-          </a:p>
           <a:p>
             <a:pPr lvl="1"/>
             <a:r>
               <a:rPr lang="en-US" dirty="0"/>
-              <a:t>Sends currently logged in user and group name to database</a:t>
+              <a:t>Join Group</a:t>
             </a:r>
           </a:p>
           <a:p>
             <a:pPr lvl="1"/>
             <a:r>
               <a:rPr lang="en-US" dirty="0"/>
-              <a:t>Return a secret token</a:t>
-            </a:r>
-          </a:p>
-          <a:p>
-            <a:r>
-              <a:rPr lang="en-US" dirty="0" err="1"/>
-              <a:t>TextView</a:t>
-            </a:r>
-            <a:r>
-              <a:rPr lang="en-US" dirty="0"/>
-              <a:t> – secret token</a:t>
-            </a:r>
+              <a:t>Leave Group</a:t>
+            </a:r>
+          </a:p>
+          <a:p>
+            <a:pPr lvl="1"/>
+            <a:r>
+              <a:rPr lang="en-US" dirty="0" smtClean="0"/>
+              <a:t>Administer Group</a:t>
+            </a:r>
+            <a:endParaRPr lang="en-US" dirty="0"/>
+          </a:p>
+          <a:p>
+            <a:pPr lvl="1"/>
+            <a:r>
+              <a:rPr lang="en-US" dirty="0" smtClean="0"/>
+              <a:t>Submit </a:t>
+            </a:r>
+            <a:r>
+              <a:rPr lang="en-US" dirty="0"/>
+              <a:t>Receipt</a:t>
+            </a:r>
+          </a:p>
+          <a:p>
+            <a:pPr lvl="2"/>
+            <a:endParaRPr lang="en-US" dirty="0"/>
           </a:p>
         </p:txBody>
       </p:sp>
     </p:spTree>
     <p:extLst>
       <p:ext uri="{BB962C8B-B14F-4D97-AF65-F5344CB8AC3E}">
-        <p14:creationId xmlns:p14="http://schemas.microsoft.com/office/powerpoint/2010/main" val="1997708516"/>
+        <p14:creationId xmlns:p14="http://schemas.microsoft.com/office/powerpoint/2010/main" val="3710682828"/>
       </p:ext>
     </p:extLst>
   </p:cSld>
@@ -3820,7 +3918,7 @@
           <a:p>
             <a:r>
               <a:rPr lang="en-US" dirty="0"/>
-              <a:t>Administer Group</a:t>
+              <a:t>Create Group</a:t>
             </a:r>
           </a:p>
         </p:txBody>
@@ -3837,10 +3935,93 @@
         </p:nvSpPr>
         <p:spPr/>
         <p:txBody>
-          <a:bodyPr>
-            <a:normAutofit fontScale="92500" lnSpcReduction="20000"/>
-          </a:bodyPr>
-          <a:lstStyle/>
+          <a:bodyPr/>
+          <a:lstStyle/>
+          <a:p>
+            <a:r>
+              <a:rPr lang="en-US" dirty="0" err="1"/>
+              <a:t>EditText</a:t>
+            </a:r>
+            <a:r>
+              <a:rPr lang="en-US" dirty="0"/>
+              <a:t> – </a:t>
+            </a:r>
+            <a:r>
+              <a:rPr lang="en-US" dirty="0" smtClean="0"/>
+              <a:t>Group </a:t>
+            </a:r>
+            <a:r>
+              <a:rPr lang="en-US" dirty="0"/>
+              <a:t>N</a:t>
+            </a:r>
+            <a:r>
+              <a:rPr lang="en-US" dirty="0" smtClean="0"/>
+              <a:t>ame</a:t>
+            </a:r>
+            <a:endParaRPr lang="en-US" dirty="0"/>
+          </a:p>
+          <a:p>
+            <a:r>
+              <a:rPr lang="en-US" dirty="0"/>
+              <a:t>Button – </a:t>
+            </a:r>
+            <a:r>
+              <a:rPr lang="en-US" dirty="0" smtClean="0"/>
+              <a:t>Create </a:t>
+            </a:r>
+            <a:r>
+              <a:rPr lang="en-US" dirty="0"/>
+              <a:t>G</a:t>
+            </a:r>
+            <a:r>
+              <a:rPr lang="en-US" dirty="0" smtClean="0"/>
+              <a:t>roup</a:t>
+            </a:r>
+            <a:endParaRPr lang="en-US" dirty="0"/>
+          </a:p>
+          <a:p>
+            <a:pPr lvl="1"/>
+            <a:r>
+              <a:rPr lang="en-US" dirty="0"/>
+              <a:t>Sends </a:t>
+            </a:r>
+            <a:r>
+              <a:rPr lang="en-US" dirty="0" smtClean="0"/>
+              <a:t>group </a:t>
+            </a:r>
+            <a:r>
+              <a:rPr lang="en-US" dirty="0"/>
+              <a:t>name to </a:t>
+            </a:r>
+            <a:r>
+              <a:rPr lang="en-US" dirty="0" smtClean="0"/>
+              <a:t>database with current user as the group owner</a:t>
+            </a:r>
+            <a:endParaRPr lang="en-US" dirty="0"/>
+          </a:p>
+          <a:p>
+            <a:pPr lvl="1"/>
+            <a:r>
+              <a:rPr lang="en-US" dirty="0" smtClean="0"/>
+              <a:t>Database r</a:t>
+            </a:r>
+            <a:r>
+              <a:rPr lang="en-US" dirty="0" smtClean="0"/>
+              <a:t>eturns </a:t>
+            </a:r>
+            <a:r>
+              <a:rPr lang="en-US" dirty="0"/>
+              <a:t>a </a:t>
+            </a:r>
+            <a:r>
+              <a:rPr lang="en-US" dirty="0" smtClean="0"/>
+              <a:t>group </a:t>
+            </a:r>
+            <a:r>
+              <a:rPr lang="en-US" dirty="0"/>
+              <a:t>token</a:t>
+            </a:r>
+          </a:p>
           <a:p>
             <a:r>
               <a:rPr lang="en-US" dirty="0" err="1"/>
@@ -3848,82 +4029,20 @@
             </a:r>
             <a:r>
               <a:rPr lang="en-US" dirty="0"/>
-              <a:t> – secret token</a:t>
-            </a:r>
-          </a:p>
-          <a:p>
-            <a:r>
-              <a:rPr lang="en-US" dirty="0"/>
-              <a:t>Button – Edit Categories</a:t>
-            </a:r>
-          </a:p>
-          <a:p>
-            <a:r>
-              <a:rPr lang="en-US" dirty="0"/>
-              <a:t>Spinner – Populated by spinner selection</a:t>
-            </a:r>
-          </a:p>
-          <a:p>
-            <a:pPr lvl="1"/>
-            <a:r>
-              <a:rPr lang="en-US" dirty="0"/>
-              <a:t>Image with profile photo</a:t>
-            </a:r>
-          </a:p>
-          <a:p>
-            <a:pPr lvl="1"/>
-            <a:r>
-              <a:rPr lang="en-US" dirty="0"/>
-              <a:t>Name</a:t>
-            </a:r>
-          </a:p>
-          <a:p>
-            <a:pPr lvl="1"/>
-            <a:r>
-              <a:rPr lang="en-US" dirty="0"/>
-              <a:t>Update and Delete Buttons</a:t>
-            </a:r>
-          </a:p>
-          <a:p>
-            <a:r>
-              <a:rPr lang="en-US" dirty="0"/>
-              <a:t>Edit Categories</a:t>
-            </a:r>
-          </a:p>
-          <a:p>
-            <a:pPr lvl="1"/>
-            <a:r>
-              <a:rPr lang="en-US" dirty="0" err="1"/>
-              <a:t>EditText</a:t>
-            </a:r>
-            <a:r>
-              <a:rPr lang="en-US" dirty="0"/>
-              <a:t> – Category Name</a:t>
-            </a:r>
-          </a:p>
-          <a:p>
-            <a:pPr lvl="1"/>
-            <a:r>
-              <a:rPr lang="en-US" dirty="0" err="1"/>
-              <a:t>EditText</a:t>
-            </a:r>
-            <a:r>
-              <a:rPr lang="en-US" dirty="0"/>
-              <a:t> – Monthly limit</a:t>
-            </a:r>
-          </a:p>
-          <a:p>
-            <a:pPr lvl="1"/>
-            <a:r>
-              <a:rPr lang="en-US" dirty="0"/>
-              <a:t>Update and Delete Buttons</a:t>
-            </a:r>
-          </a:p>
-          <a:p>
-            <a:pPr lvl="1"/>
-            <a:endParaRPr lang="en-US" dirty="0"/>
-          </a:p>
-          <a:p>
+              <a:t> – </a:t>
+            </a:r>
+            <a:r>
+              <a:rPr lang="en-US" dirty="0" smtClean="0"/>
+              <a:t>Group </a:t>
+            </a:r>
+            <a:r>
+              <a:rPr lang="en-US" dirty="0"/>
+              <a:t>T</a:t>
+            </a:r>
+            <a:r>
+              <a:rPr lang="en-US" dirty="0" smtClean="0"/>
+              <a:t>oken</a:t>
+            </a:r>
             <a:endParaRPr lang="en-US" dirty="0"/>
           </a:p>
         </p:txBody>
@@ -3931,7 +4050,7 @@
     </p:spTree>
     <p:extLst>
       <p:ext uri="{BB962C8B-B14F-4D97-AF65-F5344CB8AC3E}">
-        <p14:creationId xmlns:p14="http://schemas.microsoft.com/office/powerpoint/2010/main" val="3261949089"/>
+        <p14:creationId xmlns:p14="http://schemas.microsoft.com/office/powerpoint/2010/main" val="1997708516"/>
       </p:ext>
     </p:extLst>
   </p:cSld>
@@ -4001,20 +4120,38 @@
             </a:r>
             <a:r>
               <a:rPr lang="en-US" dirty="0"/>
-              <a:t> – secret token</a:t>
-            </a:r>
-          </a:p>
-          <a:p>
-            <a:r>
-              <a:rPr lang="en-US" dirty="0"/>
-              <a:t>Button – join</a:t>
-            </a:r>
+              <a:t> – </a:t>
+            </a:r>
+            <a:r>
+              <a:rPr lang="en-US" dirty="0" smtClean="0"/>
+              <a:t>Group Token</a:t>
+            </a:r>
+            <a:endParaRPr lang="en-US" dirty="0"/>
+          </a:p>
+          <a:p>
+            <a:r>
+              <a:rPr lang="en-US" dirty="0"/>
+              <a:t>Button – </a:t>
+            </a:r>
+            <a:r>
+              <a:rPr lang="en-US" dirty="0" smtClean="0"/>
+              <a:t>Join Group</a:t>
+            </a:r>
+            <a:endParaRPr lang="en-US" dirty="0"/>
           </a:p>
           <a:p>
             <a:pPr lvl="1"/>
             <a:r>
               <a:rPr lang="en-US" dirty="0"/>
-              <a:t>Adds category for user with a default limit</a:t>
+              <a:t>Adds category for </a:t>
+            </a:r>
+            <a:r>
+              <a:rPr lang="en-US" dirty="0" smtClean="0"/>
+              <a:t>current user </a:t>
+            </a:r>
+            <a:r>
+              <a:rPr lang="en-US" dirty="0"/>
+              <a:t>with a default limit</a:t>
             </a:r>
           </a:p>
         </p:txBody>
@@ -4066,7 +4203,7 @@
           <a:p>
             <a:r>
               <a:rPr lang="en-US" dirty="0"/>
-              <a:t>View Spending</a:t>
+              <a:t>Administer Group</a:t>
             </a:r>
           </a:p>
         </p:txBody>
@@ -4083,67 +4220,119 @@
         </p:nvSpPr>
         <p:spPr/>
         <p:txBody>
-          <a:bodyPr/>
-          <a:lstStyle/>
+          <a:bodyPr>
+            <a:normAutofit/>
+          </a:bodyPr>
+          <a:lstStyle/>
+          <a:p>
+            <a:r>
+              <a:rPr lang="en-US" dirty="0" smtClean="0"/>
+              <a:t>Edit Group</a:t>
+            </a:r>
+          </a:p>
+          <a:p>
+            <a:pPr lvl="1"/>
+            <a:r>
+              <a:rPr lang="en-US" dirty="0" err="1" smtClean="0"/>
+              <a:t>EditText</a:t>
+            </a:r>
+            <a:r>
+              <a:rPr lang="en-US" dirty="0" smtClean="0"/>
+              <a:t> for group name</a:t>
+            </a:r>
+            <a:endParaRPr lang="en-US" dirty="0" smtClean="0"/>
+          </a:p>
+          <a:p>
+            <a:pPr lvl="1"/>
+            <a:r>
+              <a:rPr lang="en-US" dirty="0" smtClean="0"/>
+              <a:t>Delete and Update buttons</a:t>
+            </a:r>
+            <a:endParaRPr lang="en-US" dirty="0"/>
+          </a:p>
+          <a:p>
+            <a:r>
+              <a:rPr lang="en-US" dirty="0"/>
+              <a:t>Edit Categories</a:t>
+            </a:r>
+          </a:p>
+          <a:p>
+            <a:pPr lvl="1"/>
+            <a:r>
+              <a:rPr lang="en-US" dirty="0"/>
+              <a:t>Spinner </a:t>
+            </a:r>
+            <a:r>
+              <a:rPr lang="en-US" dirty="0" smtClean="0"/>
+              <a:t>to select  category</a:t>
+            </a:r>
+            <a:endParaRPr lang="en-US" dirty="0" smtClean="0"/>
+          </a:p>
+          <a:p>
+            <a:pPr lvl="1"/>
+            <a:r>
+              <a:rPr lang="en-US" dirty="0" err="1" smtClean="0"/>
+              <a:t>EditText</a:t>
+            </a:r>
+            <a:r>
+              <a:rPr lang="en-US" dirty="0" smtClean="0"/>
+              <a:t> to select </a:t>
+            </a:r>
+            <a:r>
+              <a:rPr lang="en-US" dirty="0"/>
+              <a:t>m</a:t>
+            </a:r>
+            <a:r>
+              <a:rPr lang="en-US" dirty="0" smtClean="0"/>
+              <a:t>onthly </a:t>
+            </a:r>
+            <a:r>
+              <a:rPr lang="en-US" dirty="0"/>
+              <a:t>limit</a:t>
+            </a:r>
+          </a:p>
+          <a:p>
+            <a:pPr lvl="1"/>
+            <a:r>
+              <a:rPr lang="en-US" dirty="0" smtClean="0"/>
+              <a:t>Delete and Update buttons</a:t>
+            </a:r>
+          </a:p>
           <a:p>
             <a:r>
               <a:rPr lang="en-US" dirty="0" err="1"/>
-              <a:t>DateTimePicker</a:t>
-            </a:r>
-            <a:r>
-              <a:rPr lang="en-US" dirty="0"/>
-              <a:t> for start</a:t>
+              <a:t>TextView</a:t>
+            </a:r>
+            <a:r>
+              <a:rPr lang="en-US" dirty="0"/>
+              <a:t> – </a:t>
+            </a:r>
+            <a:r>
+              <a:rPr lang="en-US" dirty="0" smtClean="0"/>
+              <a:t>group </a:t>
+            </a:r>
+            <a:r>
+              <a:rPr lang="en-US" dirty="0"/>
+              <a:t>token</a:t>
             </a:r>
           </a:p>
           <a:p>
             <a:pPr lvl="1"/>
-            <a:r>
-              <a:rPr lang="en-US" dirty="0"/>
-              <a:t>Default to start of current month</a:t>
-            </a:r>
-          </a:p>
-          <a:p>
-            <a:r>
-              <a:rPr lang="en-US" dirty="0" err="1"/>
-              <a:t>DateTimePicker</a:t>
-            </a:r>
-            <a:r>
-              <a:rPr lang="en-US" dirty="0"/>
-              <a:t> for end</a:t>
-            </a:r>
+            <a:endParaRPr lang="en-US" dirty="0"/>
           </a:p>
           <a:p>
             <a:pPr lvl="1"/>
-            <a:r>
-              <a:rPr lang="en-US" dirty="0"/>
-              <a:t>Default to current day</a:t>
-            </a:r>
-          </a:p>
-          <a:p>
-            <a:r>
-              <a:rPr lang="en-US" dirty="0"/>
-              <a:t>Spinner to choose category</a:t>
-            </a:r>
-          </a:p>
-          <a:p>
-            <a:pPr marL="742950" lvl="2" indent="-342900"/>
-            <a:r>
-              <a:rPr lang="en-US" dirty="0"/>
-              <a:t>Spinner has all or individual</a:t>
-            </a:r>
-          </a:p>
-          <a:p>
-            <a:r>
-              <a:rPr lang="en-US" dirty="0"/>
-              <a:t>Button to submit</a:t>
-            </a:r>
+            <a:endParaRPr lang="en-US" dirty="0"/>
+          </a:p>
+          <a:p>
+            <a:endParaRPr lang="en-US" dirty="0"/>
           </a:p>
         </p:txBody>
       </p:sp>
     </p:spTree>
     <p:extLst>
       <p:ext uri="{BB962C8B-B14F-4D97-AF65-F5344CB8AC3E}">
-        <p14:creationId xmlns:p14="http://schemas.microsoft.com/office/powerpoint/2010/main" val="3163152585"/>
+        <p14:creationId xmlns:p14="http://schemas.microsoft.com/office/powerpoint/2010/main" val="3261949089"/>
       </p:ext>
     </p:extLst>
   </p:cSld>
@@ -4187,7 +4376,7 @@
           <a:p>
             <a:r>
               <a:rPr lang="en-US" dirty="0"/>
-              <a:t>Search Results</a:t>
+              <a:t>Submit Receipt</a:t>
             </a:r>
           </a:p>
         </p:txBody>
@@ -4204,12 +4393,73 @@
         </p:nvSpPr>
         <p:spPr/>
         <p:txBody>
-          <a:bodyPr/>
-          <a:lstStyle/>
+          <a:bodyPr>
+            <a:normAutofit/>
+          </a:bodyPr>
+          <a:lstStyle/>
+          <a:p>
+            <a:r>
+              <a:rPr lang="en-US" dirty="0"/>
+              <a:t>Spinner for category</a:t>
+            </a:r>
+          </a:p>
           <a:p>
             <a:r>
               <a:rPr lang="en-US" dirty="0" err="1"/>
-              <a:t>ListView</a:t>
+              <a:t>EditText</a:t>
+            </a:r>
+            <a:r>
+              <a:rPr lang="en-US" dirty="0"/>
+              <a:t> for amount</a:t>
+            </a:r>
+          </a:p>
+          <a:p>
+            <a:r>
+              <a:rPr lang="en-US" dirty="0"/>
+              <a:t>Button – Upload Photo</a:t>
+            </a:r>
+          </a:p>
+          <a:p>
+            <a:pPr lvl="1"/>
+            <a:r>
+              <a:rPr lang="en-US" dirty="0"/>
+              <a:t>Browse for photo</a:t>
+            </a:r>
+          </a:p>
+          <a:p>
+            <a:r>
+              <a:rPr lang="en-US" dirty="0" err="1" smtClean="0"/>
+              <a:t>ImageView</a:t>
+            </a:r>
+            <a:r>
+              <a:rPr lang="en-US" dirty="0" smtClean="0"/>
+              <a:t> </a:t>
+            </a:r>
+            <a:r>
+              <a:rPr lang="en-US" dirty="0"/>
+              <a:t>for receipt</a:t>
+            </a:r>
+          </a:p>
+          <a:p>
+            <a:r>
+              <a:rPr lang="en-US" dirty="0" smtClean="0"/>
+              <a:t>Button </a:t>
+            </a:r>
+            <a:r>
+              <a:rPr lang="en-US" dirty="0"/>
+              <a:t>– </a:t>
+            </a:r>
+            <a:r>
+              <a:rPr lang="en-US" dirty="0" smtClean="0"/>
+              <a:t>Submit Receipt</a:t>
+            </a:r>
+            <a:endParaRPr lang="en-US" dirty="0"/>
+          </a:p>
+          <a:p>
+            <a:pPr lvl="1"/>
+            <a:r>
+              <a:rPr lang="en-US" dirty="0" smtClean="0"/>
+              <a:t>Shows dialog indicating success or failure</a:t>
             </a:r>
             <a:endParaRPr lang="en-US" dirty="0"/>
           </a:p>
@@ -4218,7 +4468,7 @@
     </p:spTree>
     <p:extLst>
       <p:ext uri="{BB962C8B-B14F-4D97-AF65-F5344CB8AC3E}">
-        <p14:creationId xmlns:p14="http://schemas.microsoft.com/office/powerpoint/2010/main" val="1455448113"/>
+        <p14:creationId xmlns:p14="http://schemas.microsoft.com/office/powerpoint/2010/main" val="535213632"/>
       </p:ext>
     </p:extLst>
   </p:cSld>
@@ -4262,7 +4512,7 @@
           <a:p>
             <a:r>
               <a:rPr lang="en-US" dirty="0"/>
-              <a:t>Submit Receipt</a:t>
+              <a:t>View Spending</a:t>
             </a:r>
           </a:p>
         </p:txBody>
@@ -4284,46 +4534,62 @@
           <a:p>
             <a:r>
               <a:rPr lang="en-US" dirty="0"/>
-              <a:t>Spinner for category</a:t>
+              <a:t>Spinner to choose category</a:t>
+            </a:r>
+          </a:p>
+          <a:p>
+            <a:pPr marL="742950" lvl="2" indent="-342900"/>
+            <a:r>
+              <a:rPr lang="en-US"/>
+              <a:t>Spinner has all or individual</a:t>
+            </a:r>
+          </a:p>
+          <a:p>
+            <a:r>
+              <a:rPr lang="en-US" smtClean="0"/>
+              <a:t>DateTimePicker</a:t>
+            </a:r>
+            <a:r>
+              <a:rPr lang="en-US" dirty="0" smtClean="0"/>
+              <a:t> </a:t>
+            </a:r>
+            <a:r>
+              <a:rPr lang="en-US" dirty="0"/>
+              <a:t>for start</a:t>
+            </a:r>
+          </a:p>
+          <a:p>
+            <a:pPr lvl="1"/>
+            <a:r>
+              <a:rPr lang="en-US" dirty="0"/>
+              <a:t>Default to start of current month</a:t>
             </a:r>
           </a:p>
           <a:p>
             <a:r>
               <a:rPr lang="en-US" dirty="0" err="1"/>
-              <a:t>EditText</a:t>
-            </a:r>
-            <a:r>
-              <a:rPr lang="en-US" dirty="0"/>
-              <a:t> for amount</a:t>
-            </a:r>
-          </a:p>
-          <a:p>
-            <a:r>
-              <a:rPr lang="en-US" dirty="0" err="1"/>
-              <a:t>ImageView</a:t>
-            </a:r>
-            <a:r>
-              <a:rPr lang="en-US" dirty="0"/>
-              <a:t> for receipt</a:t>
-            </a:r>
-          </a:p>
-          <a:p>
-            <a:r>
-              <a:rPr lang="en-US" dirty="0"/>
-              <a:t>Button</a:t>
+              <a:t>DateTimePicker</a:t>
+            </a:r>
+            <a:r>
+              <a:rPr lang="en-US" dirty="0"/>
+              <a:t> for end</a:t>
             </a:r>
           </a:p>
           <a:p>
             <a:pPr lvl="1"/>
             <a:r>
               <a:rPr lang="en-US" dirty="0"/>
-              <a:t>Browse for receipt or take a picture</a:t>
-            </a:r>
-          </a:p>
-          <a:p>
-            <a:r>
-              <a:rPr lang="en-US" dirty="0"/>
-              <a:t>Button to submit</a:t>
+              <a:t>Default to current day</a:t>
+            </a:r>
+          </a:p>
+          <a:p>
+            <a:r>
+              <a:rPr lang="en-US" dirty="0" smtClean="0"/>
+              <a:t>Button </a:t>
+            </a:r>
+            <a:r>
+              <a:rPr lang="en-US" dirty="0"/>
+              <a:t>to submit</a:t>
             </a:r>
           </a:p>
         </p:txBody>
@@ -4331,7 +4597,7 @@
     </p:spTree>
     <p:extLst>
       <p:ext uri="{BB962C8B-B14F-4D97-AF65-F5344CB8AC3E}">
-        <p14:creationId xmlns:p14="http://schemas.microsoft.com/office/powerpoint/2010/main" val="535213632"/>
+        <p14:creationId xmlns:p14="http://schemas.microsoft.com/office/powerpoint/2010/main" val="3163152585"/>
       </p:ext>
     </p:extLst>
   </p:cSld>

</xml_diff>

<commit_message>
Added master/detail for expenses. Added expense date and description for expenses. Added ScrollView for register activity/profile activity/submit receipt activity/detail fragment. Removed unused imports.
</commit_message>
<xml_diff>
--- a/ProjectLayouts.pptx
+++ b/ProjectLayouts.pptx
@@ -14,8 +14,6 @@
     <p:sldId id="261" r:id="rId8"/>
     <p:sldId id="266" r:id="rId9"/>
     <p:sldId id="264" r:id="rId10"/>
-    <p:sldId id="265" r:id="rId11"/>
-    <p:sldId id="267" r:id="rId12"/>
   </p:sldIdLst>
   <p:sldSz cx="9144000" cy="6858000" type="screen4x3"/>
   <p:notesSz cx="6858000" cy="9144000"/>
@@ -312,7 +310,7 @@
           <a:p>
             <a:fld id="{566A6A97-3DE1-4BF9-B118-F24947EF4732}" type="datetimeFigureOut">
               <a:rPr lang="en-US" smtClean="0"/>
-              <a:t>11/24/2019</a:t>
+              <a:t>11/25/2019</a:t>
             </a:fld>
             <a:endParaRPr lang="en-US"/>
           </a:p>
@@ -480,7 +478,7 @@
           <a:p>
             <a:fld id="{566A6A97-3DE1-4BF9-B118-F24947EF4732}" type="datetimeFigureOut">
               <a:rPr lang="en-US" smtClean="0"/>
-              <a:t>11/24/2019</a:t>
+              <a:t>11/25/2019</a:t>
             </a:fld>
             <a:endParaRPr lang="en-US"/>
           </a:p>
@@ -658,7 +656,7 @@
           <a:p>
             <a:fld id="{566A6A97-3DE1-4BF9-B118-F24947EF4732}" type="datetimeFigureOut">
               <a:rPr lang="en-US" smtClean="0"/>
-              <a:t>11/24/2019</a:t>
+              <a:t>11/25/2019</a:t>
             </a:fld>
             <a:endParaRPr lang="en-US"/>
           </a:p>
@@ -826,7 +824,7 @@
           <a:p>
             <a:fld id="{566A6A97-3DE1-4BF9-B118-F24947EF4732}" type="datetimeFigureOut">
               <a:rPr lang="en-US" smtClean="0"/>
-              <a:t>11/24/2019</a:t>
+              <a:t>11/25/2019</a:t>
             </a:fld>
             <a:endParaRPr lang="en-US"/>
           </a:p>
@@ -1071,7 +1069,7 @@
           <a:p>
             <a:fld id="{566A6A97-3DE1-4BF9-B118-F24947EF4732}" type="datetimeFigureOut">
               <a:rPr lang="en-US" smtClean="0"/>
-              <a:t>11/24/2019</a:t>
+              <a:t>11/25/2019</a:t>
             </a:fld>
             <a:endParaRPr lang="en-US"/>
           </a:p>
@@ -1356,7 +1354,7 @@
           <a:p>
             <a:fld id="{566A6A97-3DE1-4BF9-B118-F24947EF4732}" type="datetimeFigureOut">
               <a:rPr lang="en-US" smtClean="0"/>
-              <a:t>11/24/2019</a:t>
+              <a:t>11/25/2019</a:t>
             </a:fld>
             <a:endParaRPr lang="en-US"/>
           </a:p>
@@ -1775,7 +1773,7 @@
           <a:p>
             <a:fld id="{566A6A97-3DE1-4BF9-B118-F24947EF4732}" type="datetimeFigureOut">
               <a:rPr lang="en-US" smtClean="0"/>
-              <a:t>11/24/2019</a:t>
+              <a:t>11/25/2019</a:t>
             </a:fld>
             <a:endParaRPr lang="en-US"/>
           </a:p>
@@ -1892,7 +1890,7 @@
           <a:p>
             <a:fld id="{566A6A97-3DE1-4BF9-B118-F24947EF4732}" type="datetimeFigureOut">
               <a:rPr lang="en-US" smtClean="0"/>
-              <a:t>11/24/2019</a:t>
+              <a:t>11/25/2019</a:t>
             </a:fld>
             <a:endParaRPr lang="en-US"/>
           </a:p>
@@ -1987,7 +1985,7 @@
           <a:p>
             <a:fld id="{566A6A97-3DE1-4BF9-B118-F24947EF4732}" type="datetimeFigureOut">
               <a:rPr lang="en-US" smtClean="0"/>
-              <a:t>11/24/2019</a:t>
+              <a:t>11/25/2019</a:t>
             </a:fld>
             <a:endParaRPr lang="en-US"/>
           </a:p>
@@ -2262,7 +2260,7 @@
           <a:p>
             <a:fld id="{566A6A97-3DE1-4BF9-B118-F24947EF4732}" type="datetimeFigureOut">
               <a:rPr lang="en-US" smtClean="0"/>
-              <a:t>11/24/2019</a:t>
+              <a:t>11/25/2019</a:t>
             </a:fld>
             <a:endParaRPr lang="en-US"/>
           </a:p>
@@ -2514,7 +2512,7 @@
           <a:p>
             <a:fld id="{566A6A97-3DE1-4BF9-B118-F24947EF4732}" type="datetimeFigureOut">
               <a:rPr lang="en-US" smtClean="0"/>
-              <a:t>11/24/2019</a:t>
+              <a:t>11/25/2019</a:t>
             </a:fld>
             <a:endParaRPr lang="en-US"/>
           </a:p>
@@ -2725,7 +2723,7 @@
           <a:p>
             <a:fld id="{566A6A97-3DE1-4BF9-B118-F24947EF4732}" type="datetimeFigureOut">
               <a:rPr lang="en-US" smtClean="0"/>
-              <a:t>11/24/2019</a:t>
+              <a:t>11/25/2019</a:t>
             </a:fld>
             <a:endParaRPr lang="en-US"/>
           </a:p>
@@ -3222,164 +3220,6 @@
 </p:sld>
 </file>
 
-<file path=ppt/slides/slide10.xml><?xml version="1.0" encoding="utf-8"?>
-<p:sld xmlns:a="http://schemas.openxmlformats.org/drawingml/2006/main" xmlns:r="http://schemas.openxmlformats.org/officeDocument/2006/relationships" xmlns:p="http://schemas.openxmlformats.org/presentationml/2006/main">
-  <p:cSld>
-    <p:spTree>
-      <p:nvGrpSpPr>
-        <p:cNvPr id="1" name=""/>
-        <p:cNvGrpSpPr/>
-        <p:nvPr/>
-      </p:nvGrpSpPr>
-      <p:grpSpPr>
-        <a:xfrm>
-          <a:off x="0" y="0"/>
-          <a:ext cx="0" cy="0"/>
-          <a:chOff x="0" y="0"/>
-          <a:chExt cx="0" cy="0"/>
-        </a:xfrm>
-      </p:grpSpPr>
-      <p:sp>
-        <p:nvSpPr>
-          <p:cNvPr id="2" name="Title 1"/>
-          <p:cNvSpPr>
-            <a:spLocks noGrp="1"/>
-          </p:cNvSpPr>
-          <p:nvPr>
-            <p:ph type="title"/>
-          </p:nvPr>
-        </p:nvSpPr>
-        <p:spPr/>
-        <p:txBody>
-          <a:bodyPr/>
-          <a:lstStyle/>
-          <a:p>
-            <a:r>
-              <a:rPr lang="en-US" dirty="0"/>
-              <a:t>Search Results</a:t>
-            </a:r>
-          </a:p>
-        </p:txBody>
-      </p:sp>
-      <p:sp>
-        <p:nvSpPr>
-          <p:cNvPr id="3" name="Content Placeholder 2"/>
-          <p:cNvSpPr>
-            <a:spLocks noGrp="1"/>
-          </p:cNvSpPr>
-          <p:nvPr>
-            <p:ph idx="1"/>
-          </p:nvPr>
-        </p:nvSpPr>
-        <p:spPr/>
-        <p:txBody>
-          <a:bodyPr/>
-          <a:lstStyle/>
-          <a:p>
-            <a:r>
-              <a:rPr lang="en-US" dirty="0" err="1"/>
-              <a:t>ListView</a:t>
-            </a:r>
-            <a:endParaRPr lang="en-US" dirty="0"/>
-          </a:p>
-        </p:txBody>
-      </p:sp>
-    </p:spTree>
-    <p:extLst>
-      <p:ext uri="{BB962C8B-B14F-4D97-AF65-F5344CB8AC3E}">
-        <p14:creationId xmlns:p14="http://schemas.microsoft.com/office/powerpoint/2010/main" val="1455448113"/>
-      </p:ext>
-    </p:extLst>
-  </p:cSld>
-  <p:clrMapOvr>
-    <a:masterClrMapping/>
-  </p:clrMapOvr>
-</p:sld>
-</file>
-
-<file path=ppt/slides/slide11.xml><?xml version="1.0" encoding="utf-8"?>
-<p:sld xmlns:a="http://schemas.openxmlformats.org/drawingml/2006/main" xmlns:r="http://schemas.openxmlformats.org/officeDocument/2006/relationships" xmlns:p="http://schemas.openxmlformats.org/presentationml/2006/main">
-  <p:cSld>
-    <p:spTree>
-      <p:nvGrpSpPr>
-        <p:cNvPr id="1" name=""/>
-        <p:cNvGrpSpPr/>
-        <p:nvPr/>
-      </p:nvGrpSpPr>
-      <p:grpSpPr>
-        <a:xfrm>
-          <a:off x="0" y="0"/>
-          <a:ext cx="0" cy="0"/>
-          <a:chOff x="0" y="0"/>
-          <a:chExt cx="0" cy="0"/>
-        </a:xfrm>
-      </p:grpSpPr>
-      <p:sp>
-        <p:nvSpPr>
-          <p:cNvPr id="2" name="Title 1">
-            <a:extLst>
-              <a:ext uri="{FF2B5EF4-FFF2-40B4-BE49-F238E27FC236}">
-                <a16:creationId xmlns:a16="http://schemas.microsoft.com/office/drawing/2014/main" xmlns="" id="{4452320C-D5FF-4041-B9CE-91C19F5D427E}"/>
-              </a:ext>
-            </a:extLst>
-          </p:cNvPr>
-          <p:cNvSpPr>
-            <a:spLocks noGrp="1"/>
-          </p:cNvSpPr>
-          <p:nvPr>
-            <p:ph type="title"/>
-          </p:nvPr>
-        </p:nvSpPr>
-        <p:spPr/>
-        <p:txBody>
-          <a:bodyPr/>
-          <a:lstStyle/>
-          <a:p>
-            <a:r>
-              <a:rPr lang="en-US" dirty="0"/>
-              <a:t>Backup</a:t>
-            </a:r>
-          </a:p>
-        </p:txBody>
-      </p:sp>
-      <p:sp>
-        <p:nvSpPr>
-          <p:cNvPr id="3" name="Content Placeholder 2">
-            <a:extLst>
-              <a:ext uri="{FF2B5EF4-FFF2-40B4-BE49-F238E27FC236}">
-                <a16:creationId xmlns:a16="http://schemas.microsoft.com/office/drawing/2014/main" xmlns="" id="{234B904D-9E3D-4A4B-B1AD-BD9C8DB4C56A}"/>
-              </a:ext>
-            </a:extLst>
-          </p:cNvPr>
-          <p:cNvSpPr>
-            <a:spLocks noGrp="1"/>
-          </p:cNvSpPr>
-          <p:nvPr>
-            <p:ph idx="1"/>
-          </p:nvPr>
-        </p:nvSpPr>
-        <p:spPr/>
-        <p:txBody>
-          <a:bodyPr/>
-          <a:lstStyle/>
-          <a:p>
-            <a:endParaRPr lang="en-US"/>
-          </a:p>
-        </p:txBody>
-      </p:sp>
-    </p:spTree>
-    <p:extLst>
-      <p:ext uri="{BB962C8B-B14F-4D97-AF65-F5344CB8AC3E}">
-        <p14:creationId xmlns:p14="http://schemas.microsoft.com/office/powerpoint/2010/main" val="3436432575"/>
-      </p:ext>
-    </p:extLst>
-  </p:cSld>
-  <p:clrMapOvr>
-    <a:masterClrMapping/>
-  </p:clrMapOvr>
-</p:sld>
-</file>
-
 <file path=ppt/slides/slide2.xml><?xml version="1.0" encoding="utf-8"?>
 <p:sld xmlns:a="http://schemas.openxmlformats.org/drawingml/2006/main" xmlns:r="http://schemas.openxmlformats.org/officeDocument/2006/relationships" xmlns:p="http://schemas.openxmlformats.org/presentationml/2006/main">
   <p:cSld>
@@ -3433,7 +3273,7 @@
         <p:spPr/>
         <p:txBody>
           <a:bodyPr>
-            <a:normAutofit fontScale="70000" lnSpcReduction="20000"/>
+            <a:normAutofit fontScale="62500" lnSpcReduction="20000"/>
           </a:bodyPr>
           <a:lstStyle/>
           <a:p>
@@ -3447,7 +3287,6 @@
               <a:rPr lang="en-US" dirty="0" smtClean="0"/>
               <a:t>Profile Activity shows Navigation Drawer and App Bar</a:t>
             </a:r>
-            <a:endParaRPr lang="en-US" dirty="0" smtClean="0"/>
           </a:p>
           <a:p>
             <a:r>
@@ -3470,7 +3309,11 @@
             </a:r>
             <a:r>
               <a:rPr lang="en-US" dirty="0"/>
-              <a:t> – Password</a:t>
+              <a:t> – </a:t>
+            </a:r>
+            <a:r>
+              <a:rPr lang="en-US" dirty="0" smtClean="0"/>
+              <a:t>Password</a:t>
             </a:r>
           </a:p>
           <a:p>
@@ -3480,7 +3323,11 @@
             </a:r>
             <a:r>
               <a:rPr lang="en-US" dirty="0"/>
-              <a:t> – City</a:t>
+              <a:t> – </a:t>
+            </a:r>
+            <a:r>
+              <a:rPr lang="en-US" dirty="0" smtClean="0"/>
+              <a:t>First Name</a:t>
             </a:r>
           </a:p>
           <a:p>
@@ -3490,6 +3337,31 @@
             </a:r>
             <a:r>
               <a:rPr lang="en-US" dirty="0"/>
+              <a:t> – </a:t>
+            </a:r>
+            <a:r>
+              <a:rPr lang="en-US" dirty="0" smtClean="0"/>
+              <a:t>Last Name</a:t>
+            </a:r>
+            <a:endParaRPr lang="en-US" dirty="0"/>
+          </a:p>
+          <a:p>
+            <a:r>
+              <a:rPr lang="en-US" dirty="0" err="1"/>
+              <a:t>EditText</a:t>
+            </a:r>
+            <a:r>
+              <a:rPr lang="en-US" dirty="0"/>
+              <a:t> – City</a:t>
+            </a:r>
+          </a:p>
+          <a:p>
+            <a:r>
+              <a:rPr lang="en-US" dirty="0" err="1"/>
+              <a:t>EditText</a:t>
+            </a:r>
+            <a:r>
+              <a:rPr lang="en-US" dirty="0"/>
               <a:t> – State</a:t>
             </a:r>
           </a:p>
@@ -3558,11 +3430,7 @@
             <a:pPr lvl="1"/>
             <a:r>
               <a:rPr lang="en-US" dirty="0" smtClean="0"/>
-              <a:t>Register Activity goes</a:t>
-            </a:r>
-            <a:r>
-              <a:rPr lang="en-US" dirty="0" smtClean="0"/>
-              <a:t> </a:t>
+              <a:t>Register Activity goes </a:t>
             </a:r>
             <a:r>
               <a:rPr lang="en-US" dirty="0"/>
@@ -3570,11 +3438,7 @@
             </a:r>
             <a:r>
               <a:rPr lang="en-US" dirty="0" smtClean="0"/>
-              <a:t>Main Activity</a:t>
-            </a:r>
-            <a:r>
-              <a:rPr lang="en-US" dirty="0" smtClean="0"/>
-              <a:t> </a:t>
+              <a:t>Main Activity </a:t>
             </a:r>
             <a:r>
               <a:rPr lang="en-US" dirty="0"/>
@@ -3727,11 +3591,7 @@
             <a:pPr lvl="2"/>
             <a:r>
               <a:rPr lang="en-US" dirty="0" smtClean="0"/>
-              <a:t>Goes</a:t>
-            </a:r>
-            <a:r>
-              <a:rPr lang="en-US" dirty="0" smtClean="0"/>
-              <a:t> </a:t>
+              <a:t>Goes </a:t>
             </a:r>
             <a:r>
               <a:rPr lang="en-US" dirty="0"/>
@@ -4003,11 +3863,7 @@
             <a:pPr lvl="1"/>
             <a:r>
               <a:rPr lang="en-US" dirty="0" smtClean="0"/>
-              <a:t>Database r</a:t>
-            </a:r>
-            <a:r>
-              <a:rPr lang="en-US" dirty="0" smtClean="0"/>
-              <a:t>eturns </a:t>
+              <a:t>Database returns </a:t>
             </a:r>
             <a:r>
               <a:rPr lang="en-US" dirty="0"/>
@@ -4240,7 +4096,6 @@
               <a:rPr lang="en-US" dirty="0" smtClean="0"/>
               <a:t> for group name</a:t>
             </a:r>
-            <a:endParaRPr lang="en-US" dirty="0" smtClean="0"/>
           </a:p>
           <a:p>
             <a:pPr lvl="1"/>
@@ -4266,7 +4121,6 @@
               <a:rPr lang="en-US" dirty="0" smtClean="0"/>
               <a:t>to select  category</a:t>
             </a:r>
-            <a:endParaRPr lang="en-US" dirty="0" smtClean="0"/>
           </a:p>
           <a:p>
             <a:pPr lvl="1"/>
@@ -4394,13 +4248,35 @@
         <p:spPr/>
         <p:txBody>
           <a:bodyPr>
-            <a:normAutofit/>
+            <a:normAutofit fontScale="92500" lnSpcReduction="20000"/>
           </a:bodyPr>
           <a:lstStyle/>
           <a:p>
             <a:r>
-              <a:rPr lang="en-US" dirty="0"/>
-              <a:t>Spinner for category</a:t>
+              <a:rPr lang="en-US" dirty="0" err="1" smtClean="0"/>
+              <a:t>TextView</a:t>
+            </a:r>
+            <a:r>
+              <a:rPr lang="en-US" dirty="0" smtClean="0"/>
+              <a:t> for expense date with </a:t>
+            </a:r>
+            <a:r>
+              <a:rPr lang="en-US" dirty="0" err="1" smtClean="0"/>
+              <a:t>DatePickerDialog</a:t>
+            </a:r>
+            <a:r>
+              <a:rPr lang="en-US" dirty="0" smtClean="0"/>
+              <a:t> displayed when clicked</a:t>
+            </a:r>
+          </a:p>
+          <a:p>
+            <a:r>
+              <a:rPr lang="en-US" dirty="0" smtClean="0"/>
+              <a:t>Spinner </a:t>
+            </a:r>
+            <a:r>
+              <a:rPr lang="en-US" dirty="0"/>
+              <a:t>for category</a:t>
             </a:r>
           </a:p>
           <a:p>
@@ -4410,8 +4286,23 @@
             </a:r>
             <a:r>
               <a:rPr lang="en-US" dirty="0"/>
-              <a:t> for amount</a:t>
-            </a:r>
+              <a:t> for </a:t>
+            </a:r>
+            <a:r>
+              <a:rPr lang="en-US" dirty="0" smtClean="0"/>
+              <a:t>amount</a:t>
+            </a:r>
+          </a:p>
+          <a:p>
+            <a:r>
+              <a:rPr lang="en-US" dirty="0" err="1" smtClean="0"/>
+              <a:t>EditText</a:t>
+            </a:r>
+            <a:r>
+              <a:rPr lang="en-US" dirty="0" smtClean="0"/>
+              <a:t> for description</a:t>
+            </a:r>
+            <a:endParaRPr lang="en-US" dirty="0"/>
           </a:p>
           <a:p>
             <a:r>
@@ -4529,7 +4420,9 @@
         </p:nvSpPr>
         <p:spPr/>
         <p:txBody>
-          <a:bodyPr/>
+          <a:bodyPr>
+            <a:normAutofit/>
+          </a:bodyPr>
           <a:lstStyle/>
           <a:p>
             <a:r>
@@ -4540,46 +4433,64 @@
           <a:p>
             <a:pPr marL="742950" lvl="2" indent="-342900"/>
             <a:r>
-              <a:rPr lang="en-US"/>
+              <a:rPr lang="en-US" dirty="0"/>
               <a:t>Spinner has all or individual</a:t>
             </a:r>
           </a:p>
           <a:p>
             <a:r>
+              <a:rPr lang="en-US" dirty="0" err="1"/>
+              <a:t>TextView</a:t>
+            </a:r>
+            <a:r>
+              <a:rPr lang="en-US" dirty="0"/>
+              <a:t> for </a:t>
+            </a:r>
+            <a:r>
+              <a:rPr lang="en-US" dirty="0" smtClean="0"/>
+              <a:t>start </a:t>
+            </a:r>
+            <a:r>
+              <a:rPr lang="en-US" dirty="0"/>
+              <a:t>date with </a:t>
+            </a:r>
+            <a:r>
+              <a:rPr lang="en-US" dirty="0" err="1"/>
+              <a:t>DatePickerDialog</a:t>
+            </a:r>
+            <a:r>
+              <a:rPr lang="en-US" dirty="0"/>
+              <a:t> displayed when clicked</a:t>
+            </a:r>
+          </a:p>
+          <a:p>
+            <a:r>
+              <a:rPr lang="en-US" dirty="0" err="1"/>
+              <a:t>TextView</a:t>
+            </a:r>
+            <a:r>
+              <a:rPr lang="en-US" dirty="0"/>
+              <a:t> </a:t>
+            </a:r>
+            <a:r>
+              <a:rPr lang="en-US"/>
+              <a:t>for </a:t>
+            </a:r>
+            <a:r>
               <a:rPr lang="en-US" smtClean="0"/>
-              <a:t>DateTimePicker</a:t>
-            </a:r>
-            <a:r>
-              <a:rPr lang="en-US" dirty="0" smtClean="0"/>
-              <a:t> </a:t>
-            </a:r>
-            <a:r>
-              <a:rPr lang="en-US" dirty="0"/>
-              <a:t>for start</a:t>
-            </a:r>
-          </a:p>
-          <a:p>
-            <a:pPr lvl="1"/>
-            <a:r>
-              <a:rPr lang="en-US" dirty="0"/>
-              <a:t>Default to start of current month</a:t>
-            </a:r>
-          </a:p>
-          <a:p>
+              <a:t>end date </a:t>
+            </a:r>
+            <a:r>
+              <a:rPr lang="en-US" dirty="0"/>
+              <a:t>with </a:t>
+            </a:r>
             <a:r>
               <a:rPr lang="en-US" dirty="0" err="1"/>
-              <a:t>DateTimePicker</a:t>
-            </a:r>
-            <a:r>
-              <a:rPr lang="en-US" dirty="0"/>
-              <a:t> for end</a:t>
-            </a:r>
-          </a:p>
-          <a:p>
-            <a:pPr lvl="1"/>
-            <a:r>
-              <a:rPr lang="en-US" dirty="0"/>
-              <a:t>Default to current day</a:t>
+              <a:t>DatePickerDialog</a:t>
+            </a:r>
+            <a:r>
+              <a:rPr lang="en-US" dirty="0"/>
+              <a:t> displayed when clicked</a:t>
             </a:r>
           </a:p>
           <a:p>
@@ -4589,8 +4500,19 @@
             </a:r>
             <a:r>
               <a:rPr lang="en-US" dirty="0"/>
-              <a:t>to submit</a:t>
-            </a:r>
+              <a:t>to </a:t>
+            </a:r>
+            <a:r>
+              <a:rPr lang="en-US" dirty="0" smtClean="0"/>
+              <a:t>submit</a:t>
+            </a:r>
+          </a:p>
+          <a:p>
+            <a:r>
+              <a:rPr lang="en-US" dirty="0" smtClean="0"/>
+              <a:t>Master/Detail for displaying receipts</a:t>
+            </a:r>
+            <a:endParaRPr lang="en-US" dirty="0"/>
           </a:p>
         </p:txBody>
       </p:sp>

</xml_diff>